<commit_message>
workflow figure (created in ppt and printed as jpg)
</commit_message>
<xml_diff>
--- a/manuscript/figures/workflow_figure.pptx
+++ b/manuscript/figures/workflow_figure.pptx
@@ -6,6 +6,7 @@
   </p:sldMasterIdLst>
   <p:sldIdLst>
     <p:sldId id="256" r:id="rId2"/>
+    <p:sldId id="257" r:id="rId3"/>
   </p:sldIdLst>
   <p:sldSz cx="9144000" cy="6858000" type="screen4x3"/>
   <p:notesSz cx="6858000" cy="9144000"/>
@@ -243,7 +244,7 @@
           <a:p>
             <a:fld id="{BA75D34D-A376-4547-8179-9AA895ACA30F}" type="datetimeFigureOut">
               <a:rPr lang="en-US" smtClean="0"/>
-              <a:t>7/31/2020</a:t>
+              <a:t>8/5/2020</a:t>
             </a:fld>
             <a:endParaRPr lang="en-US"/>
           </a:p>
@@ -413,7 +414,7 @@
           <a:p>
             <a:fld id="{BA75D34D-A376-4547-8179-9AA895ACA30F}" type="datetimeFigureOut">
               <a:rPr lang="en-US" smtClean="0"/>
-              <a:t>7/31/2020</a:t>
+              <a:t>8/5/2020</a:t>
             </a:fld>
             <a:endParaRPr lang="en-US"/>
           </a:p>
@@ -593,7 +594,7 @@
           <a:p>
             <a:fld id="{BA75D34D-A376-4547-8179-9AA895ACA30F}" type="datetimeFigureOut">
               <a:rPr lang="en-US" smtClean="0"/>
-              <a:t>7/31/2020</a:t>
+              <a:t>8/5/2020</a:t>
             </a:fld>
             <a:endParaRPr lang="en-US"/>
           </a:p>
@@ -763,7 +764,7 @@
           <a:p>
             <a:fld id="{BA75D34D-A376-4547-8179-9AA895ACA30F}" type="datetimeFigureOut">
               <a:rPr lang="en-US" smtClean="0"/>
-              <a:t>7/31/2020</a:t>
+              <a:t>8/5/2020</a:t>
             </a:fld>
             <a:endParaRPr lang="en-US"/>
           </a:p>
@@ -1007,7 +1008,7 @@
           <a:p>
             <a:fld id="{BA75D34D-A376-4547-8179-9AA895ACA30F}" type="datetimeFigureOut">
               <a:rPr lang="en-US" smtClean="0"/>
-              <a:t>7/31/2020</a:t>
+              <a:t>8/5/2020</a:t>
             </a:fld>
             <a:endParaRPr lang="en-US"/>
           </a:p>
@@ -1239,7 +1240,7 @@
           <a:p>
             <a:fld id="{BA75D34D-A376-4547-8179-9AA895ACA30F}" type="datetimeFigureOut">
               <a:rPr lang="en-US" smtClean="0"/>
-              <a:t>7/31/2020</a:t>
+              <a:t>8/5/2020</a:t>
             </a:fld>
             <a:endParaRPr lang="en-US"/>
           </a:p>
@@ -1606,7 +1607,7 @@
           <a:p>
             <a:fld id="{BA75D34D-A376-4547-8179-9AA895ACA30F}" type="datetimeFigureOut">
               <a:rPr lang="en-US" smtClean="0"/>
-              <a:t>7/31/2020</a:t>
+              <a:t>8/5/2020</a:t>
             </a:fld>
             <a:endParaRPr lang="en-US"/>
           </a:p>
@@ -1724,7 +1725,7 @@
           <a:p>
             <a:fld id="{BA75D34D-A376-4547-8179-9AA895ACA30F}" type="datetimeFigureOut">
               <a:rPr lang="en-US" smtClean="0"/>
-              <a:t>7/31/2020</a:t>
+              <a:t>8/5/2020</a:t>
             </a:fld>
             <a:endParaRPr lang="en-US"/>
           </a:p>
@@ -1819,7 +1820,7 @@
           <a:p>
             <a:fld id="{BA75D34D-A376-4547-8179-9AA895ACA30F}" type="datetimeFigureOut">
               <a:rPr lang="en-US" smtClean="0"/>
-              <a:t>7/31/2020</a:t>
+              <a:t>8/5/2020</a:t>
             </a:fld>
             <a:endParaRPr lang="en-US"/>
           </a:p>
@@ -2096,7 +2097,7 @@
           <a:p>
             <a:fld id="{BA75D34D-A376-4547-8179-9AA895ACA30F}" type="datetimeFigureOut">
               <a:rPr lang="en-US" smtClean="0"/>
-              <a:t>7/31/2020</a:t>
+              <a:t>8/5/2020</a:t>
             </a:fld>
             <a:endParaRPr lang="en-US"/>
           </a:p>
@@ -2353,7 +2354,7 @@
           <a:p>
             <a:fld id="{BA75D34D-A376-4547-8179-9AA895ACA30F}" type="datetimeFigureOut">
               <a:rPr lang="en-US" smtClean="0"/>
-              <a:t>7/31/2020</a:t>
+              <a:t>8/5/2020</a:t>
             </a:fld>
             <a:endParaRPr lang="en-US"/>
           </a:p>
@@ -2566,7 +2567,7 @@
           <a:p>
             <a:fld id="{BA75D34D-A376-4547-8179-9AA895ACA30F}" type="datetimeFigureOut">
               <a:rPr lang="en-US" smtClean="0"/>
-              <a:t>7/31/2020</a:t>
+              <a:t>8/5/2020</a:t>
             </a:fld>
             <a:endParaRPr lang="en-US"/>
           </a:p>
@@ -3318,7 +3319,7 @@
         </p:nvSpPr>
         <p:spPr>
           <a:xfrm>
-            <a:off x="2531189" y="6291557"/>
+            <a:off x="2531189" y="6460834"/>
             <a:ext cx="1197033" cy="338554"/>
           </a:xfrm>
           <a:prstGeom prst="rect">
@@ -3519,7 +3520,7 @@
         <p:spPr>
           <a:xfrm>
             <a:off x="3129706" y="6001525"/>
-            <a:ext cx="0" cy="290032"/>
+            <a:ext cx="0" cy="459309"/>
           </a:xfrm>
           <a:prstGeom prst="straightConnector1">
             <a:avLst/>
@@ -3712,14 +3713,14 @@
           <p:nvPr>
             <p:extLst>
               <p:ext uri="{D42A27DB-BD31-4B8C-83A1-F6EECF244321}">
-                <p14:modId xmlns:p14="http://schemas.microsoft.com/office/powerpoint/2010/main" val="795027282"/>
+                <p14:modId xmlns:p14="http://schemas.microsoft.com/office/powerpoint/2010/main" val="3570011888"/>
               </p:ext>
             </p:extLst>
           </p:nvPr>
         </p:nvGraphicFramePr>
         <p:xfrm>
           <a:off x="5585886" y="2384387"/>
-          <a:ext cx="3681558" cy="2403744"/>
+          <a:ext cx="3681558" cy="2467681"/>
         </p:xfrm>
         <a:graphic>
           <a:graphicData uri="http://schemas.openxmlformats.org/drawingml/2006/table">
@@ -3864,18 +3865,18 @@
                   </a:ext>
                 </a:extLst>
               </a:tr>
-              <a:tr h="519988">
+              <a:tr h="583925">
                 <a:tc>
                   <a:txBody>
                     <a:bodyPr/>
                     <a:lstStyle/>
                     <a:p>
                       <a:r>
-                        <a:rPr lang="en-US" sz="1400" dirty="0" smtClean="0">
+                        <a:rPr lang="en-US" sz="1400" dirty="0" err="1" smtClean="0">
                           <a:latin typeface="Arial" panose="020B0604020202020204" pitchFamily="34" charset="0"/>
                           <a:cs typeface="Arial" panose="020B0604020202020204" pitchFamily="34" charset="0"/>
                         </a:rPr>
-                        <a:t>None</a:t>
+                        <a:t>Meso</a:t>
                       </a:r>
                       <a:endParaRPr lang="en-US" sz="1400" dirty="0">
                         <a:latin typeface="Arial" panose="020B0604020202020204" pitchFamily="34" charset="0"/>
@@ -3890,17 +3891,17 @@
                     <a:bodyPr/>
                     <a:lstStyle/>
                     <a:p>
-                      <a:endParaRPr lang="en-US"/>
+                      <a:endParaRPr lang="en-US" dirty="0"/>
                     </a:p>
                   </a:txBody>
-                  <a:tcPr vert="vert270"/>
+                  <a:tcPr/>
                 </a:tc>
                 <a:tc>
                   <a:txBody>
                     <a:bodyPr/>
                     <a:lstStyle/>
                     <a:p>
-                      <a:endParaRPr lang="en-US" sz="1400">
+                      <a:endParaRPr lang="en-US" sz="1400" dirty="0">
                         <a:latin typeface="Arial" panose="020B0604020202020204" pitchFamily="34" charset="0"/>
                         <a:cs typeface="Arial" panose="020B0604020202020204" pitchFamily="34" charset="0"/>
                       </a:endParaRPr>
@@ -3969,7 +3970,7 @@
                       <a:endParaRPr lang="en-US"/>
                     </a:p>
                   </a:txBody>
-                  <a:tcPr vert="vert270"/>
+                  <a:tcPr/>
                 </a:tc>
                 <a:tc>
                   <a:txBody>
@@ -4045,7 +4046,7 @@
                       <a:endParaRPr lang="en-US"/>
                     </a:p>
                   </a:txBody>
-                  <a:tcPr vert="vert270"/>
+                  <a:tcPr/>
                 </a:tc>
                 <a:tc>
                   <a:txBody>
@@ -4121,7 +4122,7 @@
                       <a:endParaRPr lang="en-US" dirty="0"/>
                     </a:p>
                   </a:txBody>
-                  <a:tcPr vert="vert270"/>
+                  <a:tcPr/>
                 </a:tc>
                 <a:tc>
                   <a:txBody>
@@ -4172,10 +4173,1712 @@
           </a:graphicData>
         </a:graphic>
       </p:graphicFrame>
+      <p:sp>
+        <p:nvSpPr>
+          <p:cNvPr id="3" name="TextBox 2"/>
+          <p:cNvSpPr txBox="1"/>
+          <p:nvPr/>
+        </p:nvSpPr>
+        <p:spPr>
+          <a:xfrm rot="20137366">
+            <a:off x="115007" y="2667486"/>
+            <a:ext cx="1373875" cy="261610"/>
+          </a:xfrm>
+          <a:prstGeom prst="rect">
+            <a:avLst/>
+          </a:prstGeom>
+          <a:noFill/>
+        </p:spPr>
+        <p:txBody>
+          <a:bodyPr wrap="square" rtlCol="0">
+            <a:spAutoFit/>
+          </a:bodyPr>
+          <a:lstStyle/>
+          <a:p>
+            <a:pPr algn="ctr"/>
+            <a:r>
+              <a:rPr lang="en-US" sz="1100" i="1" dirty="0" smtClean="0">
+                <a:latin typeface="Arial" panose="020B0604020202020204" pitchFamily="34" charset="0"/>
+                <a:cs typeface="Arial" panose="020B0604020202020204" pitchFamily="34" charset="0"/>
+              </a:rPr>
+              <a:t>Gaussian</a:t>
+            </a:r>
+            <a:endParaRPr lang="en-US" sz="1100" i="1" dirty="0">
+              <a:latin typeface="Arial" panose="020B0604020202020204" pitchFamily="34" charset="0"/>
+              <a:cs typeface="Arial" panose="020B0604020202020204" pitchFamily="34" charset="0"/>
+            </a:endParaRPr>
+          </a:p>
+        </p:txBody>
+      </p:sp>
+      <p:sp>
+        <p:nvSpPr>
+          <p:cNvPr id="22" name="TextBox 21"/>
+          <p:cNvSpPr txBox="1"/>
+          <p:nvPr/>
+        </p:nvSpPr>
+        <p:spPr>
+          <a:xfrm rot="1199264">
+            <a:off x="1829048" y="2704575"/>
+            <a:ext cx="1373875" cy="261610"/>
+          </a:xfrm>
+          <a:prstGeom prst="rect">
+            <a:avLst/>
+          </a:prstGeom>
+          <a:noFill/>
+        </p:spPr>
+        <p:txBody>
+          <a:bodyPr wrap="square" rtlCol="0">
+            <a:spAutoFit/>
+          </a:bodyPr>
+          <a:lstStyle/>
+          <a:p>
+            <a:pPr algn="ctr"/>
+            <a:r>
+              <a:rPr lang="en-US" sz="1100" i="1" dirty="0" smtClean="0">
+                <a:latin typeface="Arial" panose="020B0604020202020204" pitchFamily="34" charset="0"/>
+                <a:cs typeface="Arial" panose="020B0604020202020204" pitchFamily="34" charset="0"/>
+              </a:rPr>
+              <a:t>Non-Gaussian</a:t>
+            </a:r>
+            <a:endParaRPr lang="en-US" sz="1100" i="1" dirty="0">
+              <a:latin typeface="Arial" panose="020B0604020202020204" pitchFamily="34" charset="0"/>
+              <a:cs typeface="Arial" panose="020B0604020202020204" pitchFamily="34" charset="0"/>
+            </a:endParaRPr>
+          </a:p>
+        </p:txBody>
+      </p:sp>
+      <p:sp>
+        <p:nvSpPr>
+          <p:cNvPr id="28" name="TextBox 27"/>
+          <p:cNvSpPr txBox="1"/>
+          <p:nvPr/>
+        </p:nvSpPr>
+        <p:spPr>
+          <a:xfrm>
+            <a:off x="3129705" y="5983781"/>
+            <a:ext cx="1343030" cy="430887"/>
+          </a:xfrm>
+          <a:prstGeom prst="rect">
+            <a:avLst/>
+          </a:prstGeom>
+          <a:noFill/>
+        </p:spPr>
+        <p:txBody>
+          <a:bodyPr wrap="square" rtlCol="0">
+            <a:spAutoFit/>
+          </a:bodyPr>
+          <a:lstStyle/>
+          <a:p>
+            <a:pPr algn="ctr"/>
+            <a:r>
+              <a:rPr lang="en-US" sz="1100" i="1" dirty="0" smtClean="0">
+                <a:latin typeface="Arial" panose="020B0604020202020204" pitchFamily="34" charset="0"/>
+                <a:cs typeface="Arial" panose="020B0604020202020204" pitchFamily="34" charset="0"/>
+              </a:rPr>
+              <a:t>Simulated data look like real data</a:t>
+            </a:r>
+            <a:endParaRPr lang="en-US" sz="1100" i="1" dirty="0">
+              <a:latin typeface="Arial" panose="020B0604020202020204" pitchFamily="34" charset="0"/>
+              <a:cs typeface="Arial" panose="020B0604020202020204" pitchFamily="34" charset="0"/>
+            </a:endParaRPr>
+          </a:p>
+        </p:txBody>
+      </p:sp>
+      <p:sp>
+        <p:nvSpPr>
+          <p:cNvPr id="29" name="TextBox 28"/>
+          <p:cNvSpPr txBox="1"/>
+          <p:nvPr/>
+        </p:nvSpPr>
+        <p:spPr>
+          <a:xfrm rot="16200000">
+            <a:off x="536910" y="4331549"/>
+            <a:ext cx="1513494" cy="430887"/>
+          </a:xfrm>
+          <a:prstGeom prst="rect">
+            <a:avLst/>
+          </a:prstGeom>
+          <a:noFill/>
+        </p:spPr>
+        <p:txBody>
+          <a:bodyPr wrap="square" rtlCol="0">
+            <a:spAutoFit/>
+          </a:bodyPr>
+          <a:lstStyle/>
+          <a:p>
+            <a:pPr algn="ctr"/>
+            <a:r>
+              <a:rPr lang="en-US" sz="1100" i="1" dirty="0" smtClean="0">
+                <a:latin typeface="Arial" panose="020B0604020202020204" pitchFamily="34" charset="0"/>
+                <a:cs typeface="Arial" panose="020B0604020202020204" pitchFamily="34" charset="0"/>
+              </a:rPr>
+              <a:t>Simulated data do not look like real data</a:t>
+            </a:r>
+            <a:endParaRPr lang="en-US" sz="1100" i="1" dirty="0">
+              <a:latin typeface="Arial" panose="020B0604020202020204" pitchFamily="34" charset="0"/>
+              <a:cs typeface="Arial" panose="020B0604020202020204" pitchFamily="34" charset="0"/>
+            </a:endParaRPr>
+          </a:p>
+        </p:txBody>
+      </p:sp>
     </p:spTree>
     <p:extLst>
       <p:ext uri="{BB962C8B-B14F-4D97-AF65-F5344CB8AC3E}">
         <p14:creationId xmlns:p14="http://schemas.microsoft.com/office/powerpoint/2010/main" val="385929017"/>
+      </p:ext>
+    </p:extLst>
+  </p:cSld>
+  <p:clrMapOvr>
+    <a:masterClrMapping/>
+  </p:clrMapOvr>
+</p:sld>
+</file>
+
+<file path=ppt/slides/slide2.xml><?xml version="1.0" encoding="utf-8"?>
+<p:sld xmlns:a="http://schemas.openxmlformats.org/drawingml/2006/main" xmlns:r="http://schemas.openxmlformats.org/officeDocument/2006/relationships" xmlns:p="http://schemas.openxmlformats.org/presentationml/2006/main">
+  <p:cSld>
+    <p:spTree>
+      <p:nvGrpSpPr>
+        <p:cNvPr id="1" name=""/>
+        <p:cNvGrpSpPr/>
+        <p:nvPr/>
+      </p:nvGrpSpPr>
+      <p:grpSpPr>
+        <a:xfrm>
+          <a:off x="0" y="0"/>
+          <a:ext cx="0" cy="0"/>
+          <a:chOff x="0" y="0"/>
+          <a:chExt cx="0" cy="0"/>
+        </a:xfrm>
+      </p:grpSpPr>
+      <p:sp>
+        <p:nvSpPr>
+          <p:cNvPr id="4" name="TextBox 3"/>
+          <p:cNvSpPr txBox="1"/>
+          <p:nvPr/>
+        </p:nvSpPr>
+        <p:spPr>
+          <a:xfrm>
+            <a:off x="324159" y="655635"/>
+            <a:ext cx="2468880" cy="923330"/>
+          </a:xfrm>
+          <a:prstGeom prst="rect">
+            <a:avLst/>
+          </a:prstGeom>
+          <a:noFill/>
+          <a:ln>
+            <a:solidFill>
+              <a:schemeClr val="tx1"/>
+            </a:solidFill>
+          </a:ln>
+        </p:spPr>
+        <p:txBody>
+          <a:bodyPr wrap="square" rtlCol="0">
+            <a:spAutoFit/>
+          </a:bodyPr>
+          <a:lstStyle/>
+          <a:p>
+            <a:pPr algn="ctr"/>
+            <a:r>
+              <a:rPr lang="en-US" dirty="0" smtClean="0">
+                <a:latin typeface="Arial" panose="020B0604020202020204" pitchFamily="34" charset="0"/>
+                <a:cs typeface="Arial" panose="020B0604020202020204" pitchFamily="34" charset="0"/>
+              </a:rPr>
+              <a:t>Fit pilot Gaussian model w/ non-constant variance</a:t>
+            </a:r>
+            <a:endParaRPr lang="en-US" dirty="0">
+              <a:latin typeface="Arial" panose="020B0604020202020204" pitchFamily="34" charset="0"/>
+              <a:cs typeface="Arial" panose="020B0604020202020204" pitchFamily="34" charset="0"/>
+            </a:endParaRPr>
+          </a:p>
+        </p:txBody>
+      </p:sp>
+      <p:sp>
+        <p:nvSpPr>
+          <p:cNvPr id="5" name="TextBox 4"/>
+          <p:cNvSpPr txBox="1"/>
+          <p:nvPr/>
+        </p:nvSpPr>
+        <p:spPr>
+          <a:xfrm>
+            <a:off x="324159" y="1930865"/>
+            <a:ext cx="2468880" cy="646331"/>
+          </a:xfrm>
+          <a:prstGeom prst="rect">
+            <a:avLst/>
+          </a:prstGeom>
+          <a:noFill/>
+          <a:ln>
+            <a:solidFill>
+              <a:schemeClr val="tx1"/>
+            </a:solidFill>
+          </a:ln>
+        </p:spPr>
+        <p:txBody>
+          <a:bodyPr wrap="square" rtlCol="0">
+            <a:spAutoFit/>
+          </a:bodyPr>
+          <a:lstStyle/>
+          <a:p>
+            <a:pPr algn="ctr"/>
+            <a:r>
+              <a:rPr lang="en-US" dirty="0" smtClean="0">
+                <a:latin typeface="Arial" panose="020B0604020202020204" pitchFamily="34" charset="0"/>
+                <a:cs typeface="Arial" panose="020B0604020202020204" pitchFamily="34" charset="0"/>
+              </a:rPr>
+              <a:t>Inspect standardized residuals</a:t>
+            </a:r>
+            <a:endParaRPr lang="en-US" dirty="0">
+              <a:latin typeface="Arial" panose="020B0604020202020204" pitchFamily="34" charset="0"/>
+              <a:cs typeface="Arial" panose="020B0604020202020204" pitchFamily="34" charset="0"/>
+            </a:endParaRPr>
+          </a:p>
+        </p:txBody>
+      </p:sp>
+      <p:sp>
+        <p:nvSpPr>
+          <p:cNvPr id="11" name="TextBox 10"/>
+          <p:cNvSpPr txBox="1"/>
+          <p:nvPr/>
+        </p:nvSpPr>
+        <p:spPr>
+          <a:xfrm>
+            <a:off x="1895266" y="3143914"/>
+            <a:ext cx="2468880" cy="646331"/>
+          </a:xfrm>
+          <a:prstGeom prst="rect">
+            <a:avLst/>
+          </a:prstGeom>
+          <a:noFill/>
+          <a:ln>
+            <a:solidFill>
+              <a:schemeClr val="tx1"/>
+            </a:solidFill>
+          </a:ln>
+        </p:spPr>
+        <p:txBody>
+          <a:bodyPr wrap="square" rtlCol="0">
+            <a:spAutoFit/>
+          </a:bodyPr>
+          <a:lstStyle/>
+          <a:p>
+            <a:pPr algn="ctr"/>
+            <a:r>
+              <a:rPr lang="en-US" dirty="0">
+                <a:latin typeface="Arial" panose="020B0604020202020204" pitchFamily="34" charset="0"/>
+                <a:cs typeface="Arial" panose="020B0604020202020204" pitchFamily="34" charset="0"/>
+              </a:rPr>
+              <a:t>C</a:t>
+            </a:r>
+            <a:r>
+              <a:rPr lang="en-US" dirty="0" smtClean="0">
+                <a:latin typeface="Arial" panose="020B0604020202020204" pitchFamily="34" charset="0"/>
+                <a:cs typeface="Arial" panose="020B0604020202020204" pitchFamily="34" charset="0"/>
+              </a:rPr>
+              <a:t>hoose a better distribution</a:t>
+            </a:r>
+            <a:endParaRPr lang="en-US" dirty="0">
+              <a:latin typeface="Arial" panose="020B0604020202020204" pitchFamily="34" charset="0"/>
+              <a:cs typeface="Arial" panose="020B0604020202020204" pitchFamily="34" charset="0"/>
+            </a:endParaRPr>
+          </a:p>
+        </p:txBody>
+      </p:sp>
+      <p:sp>
+        <p:nvSpPr>
+          <p:cNvPr id="12" name="TextBox 11"/>
+          <p:cNvSpPr txBox="1"/>
+          <p:nvPr/>
+        </p:nvSpPr>
+        <p:spPr>
+          <a:xfrm>
+            <a:off x="1895266" y="4249554"/>
+            <a:ext cx="2468880" cy="646331"/>
+          </a:xfrm>
+          <a:prstGeom prst="rect">
+            <a:avLst/>
+          </a:prstGeom>
+          <a:noFill/>
+          <a:ln>
+            <a:solidFill>
+              <a:schemeClr val="tx1"/>
+            </a:solidFill>
+          </a:ln>
+        </p:spPr>
+        <p:txBody>
+          <a:bodyPr wrap="square" rtlCol="0">
+            <a:spAutoFit/>
+          </a:bodyPr>
+          <a:lstStyle/>
+          <a:p>
+            <a:pPr algn="ctr"/>
+            <a:r>
+              <a:rPr lang="en-US" dirty="0" smtClean="0">
+                <a:latin typeface="Arial" panose="020B0604020202020204" pitchFamily="34" charset="0"/>
+                <a:cs typeface="Arial" panose="020B0604020202020204" pitchFamily="34" charset="0"/>
+              </a:rPr>
+              <a:t>Re-fit with fixed-effect structure from step 1</a:t>
+            </a:r>
+            <a:endParaRPr lang="en-US" dirty="0">
+              <a:latin typeface="Arial" panose="020B0604020202020204" pitchFamily="34" charset="0"/>
+              <a:cs typeface="Arial" panose="020B0604020202020204" pitchFamily="34" charset="0"/>
+            </a:endParaRPr>
+          </a:p>
+        </p:txBody>
+      </p:sp>
+      <p:sp>
+        <p:nvSpPr>
+          <p:cNvPr id="13" name="TextBox 12"/>
+          <p:cNvSpPr txBox="1"/>
+          <p:nvPr/>
+        </p:nvSpPr>
+        <p:spPr>
+          <a:xfrm>
+            <a:off x="1895266" y="5355194"/>
+            <a:ext cx="2468880" cy="646331"/>
+          </a:xfrm>
+          <a:prstGeom prst="rect">
+            <a:avLst/>
+          </a:prstGeom>
+          <a:noFill/>
+          <a:ln>
+            <a:solidFill>
+              <a:schemeClr val="tx1"/>
+            </a:solidFill>
+          </a:ln>
+        </p:spPr>
+        <p:txBody>
+          <a:bodyPr wrap="square" rtlCol="0">
+            <a:spAutoFit/>
+          </a:bodyPr>
+          <a:lstStyle/>
+          <a:p>
+            <a:pPr algn="ctr"/>
+            <a:r>
+              <a:rPr lang="en-US" dirty="0" smtClean="0">
+                <a:latin typeface="Arial" panose="020B0604020202020204" pitchFamily="34" charset="0"/>
+                <a:cs typeface="Arial" panose="020B0604020202020204" pitchFamily="34" charset="0"/>
+              </a:rPr>
+              <a:t>Compute diagnostics and assess fit</a:t>
+            </a:r>
+            <a:endParaRPr lang="en-US" dirty="0">
+              <a:latin typeface="Arial" panose="020B0604020202020204" pitchFamily="34" charset="0"/>
+              <a:cs typeface="Arial" panose="020B0604020202020204" pitchFamily="34" charset="0"/>
+            </a:endParaRPr>
+          </a:p>
+        </p:txBody>
+      </p:sp>
+      <p:sp>
+        <p:nvSpPr>
+          <p:cNvPr id="14" name="Isosceles Triangle 13"/>
+          <p:cNvSpPr/>
+          <p:nvPr/>
+        </p:nvSpPr>
+        <p:spPr>
+          <a:xfrm rot="16200000">
+            <a:off x="3513165" y="3060731"/>
+            <a:ext cx="2529237" cy="812694"/>
+          </a:xfrm>
+          <a:prstGeom prst="triangle">
+            <a:avLst/>
+          </a:prstGeom>
+          <a:solidFill>
+            <a:schemeClr val="bg1">
+              <a:lumMod val="75000"/>
+            </a:schemeClr>
+          </a:solidFill>
+          <a:ln>
+            <a:noFill/>
+          </a:ln>
+        </p:spPr>
+        <p:style>
+          <a:lnRef idx="2">
+            <a:schemeClr val="accent1">
+              <a:shade val="50000"/>
+            </a:schemeClr>
+          </a:lnRef>
+          <a:fillRef idx="1">
+            <a:schemeClr val="accent1"/>
+          </a:fillRef>
+          <a:effectRef idx="0">
+            <a:schemeClr val="accent1"/>
+          </a:effectRef>
+          <a:fontRef idx="minor">
+            <a:schemeClr val="lt1"/>
+          </a:fontRef>
+        </p:style>
+        <p:txBody>
+          <a:bodyPr rtlCol="0" anchor="ctr"/>
+          <a:lstStyle/>
+          <a:p>
+            <a:pPr algn="ctr"/>
+            <a:endParaRPr lang="en-US"/>
+          </a:p>
+        </p:txBody>
+      </p:sp>
+      <p:sp>
+        <p:nvSpPr>
+          <p:cNvPr id="15" name="TextBox 14"/>
+          <p:cNvSpPr txBox="1"/>
+          <p:nvPr/>
+        </p:nvSpPr>
+        <p:spPr>
+          <a:xfrm>
+            <a:off x="964239" y="196326"/>
+            <a:ext cx="1197033" cy="338554"/>
+          </a:xfrm>
+          <a:prstGeom prst="rect">
+            <a:avLst/>
+          </a:prstGeom>
+          <a:noFill/>
+        </p:spPr>
+        <p:txBody>
+          <a:bodyPr wrap="square" rtlCol="0">
+            <a:spAutoFit/>
+          </a:bodyPr>
+          <a:lstStyle/>
+          <a:p>
+            <a:pPr algn="ctr"/>
+            <a:r>
+              <a:rPr lang="en-US" sz="1600" b="1" dirty="0" smtClean="0">
+                <a:latin typeface="Arial" panose="020B0604020202020204" pitchFamily="34" charset="0"/>
+                <a:cs typeface="Arial" panose="020B0604020202020204" pitchFamily="34" charset="0"/>
+              </a:rPr>
+              <a:t>START</a:t>
+            </a:r>
+            <a:endParaRPr lang="en-US" sz="1600" b="1" dirty="0">
+              <a:latin typeface="Arial" panose="020B0604020202020204" pitchFamily="34" charset="0"/>
+              <a:cs typeface="Arial" panose="020B0604020202020204" pitchFamily="34" charset="0"/>
+            </a:endParaRPr>
+          </a:p>
+        </p:txBody>
+      </p:sp>
+      <p:sp>
+        <p:nvSpPr>
+          <p:cNvPr id="16" name="TextBox 15"/>
+          <p:cNvSpPr txBox="1"/>
+          <p:nvPr/>
+        </p:nvSpPr>
+        <p:spPr>
+          <a:xfrm>
+            <a:off x="-332547" y="3143914"/>
+            <a:ext cx="1197033" cy="338554"/>
+          </a:xfrm>
+          <a:prstGeom prst="rect">
+            <a:avLst/>
+          </a:prstGeom>
+          <a:noFill/>
+        </p:spPr>
+        <p:txBody>
+          <a:bodyPr wrap="square" rtlCol="0">
+            <a:spAutoFit/>
+          </a:bodyPr>
+          <a:lstStyle/>
+          <a:p>
+            <a:pPr algn="ctr"/>
+            <a:r>
+              <a:rPr lang="en-US" sz="1600" b="1" dirty="0" smtClean="0">
+                <a:latin typeface="Arial" panose="020B0604020202020204" pitchFamily="34" charset="0"/>
+                <a:cs typeface="Arial" panose="020B0604020202020204" pitchFamily="34" charset="0"/>
+              </a:rPr>
+              <a:t>DONE</a:t>
+            </a:r>
+            <a:endParaRPr lang="en-US" sz="1600" b="1" dirty="0">
+              <a:latin typeface="Arial" panose="020B0604020202020204" pitchFamily="34" charset="0"/>
+              <a:cs typeface="Arial" panose="020B0604020202020204" pitchFamily="34" charset="0"/>
+            </a:endParaRPr>
+          </a:p>
+        </p:txBody>
+      </p:sp>
+      <p:sp>
+        <p:nvSpPr>
+          <p:cNvPr id="17" name="TextBox 16"/>
+          <p:cNvSpPr txBox="1"/>
+          <p:nvPr/>
+        </p:nvSpPr>
+        <p:spPr>
+          <a:xfrm>
+            <a:off x="2531189" y="6460834"/>
+            <a:ext cx="1197033" cy="338554"/>
+          </a:xfrm>
+          <a:prstGeom prst="rect">
+            <a:avLst/>
+          </a:prstGeom>
+          <a:noFill/>
+        </p:spPr>
+        <p:txBody>
+          <a:bodyPr wrap="square" rtlCol="0">
+            <a:spAutoFit/>
+          </a:bodyPr>
+          <a:lstStyle/>
+          <a:p>
+            <a:pPr algn="ctr"/>
+            <a:r>
+              <a:rPr lang="en-US" sz="1600" b="1" dirty="0" smtClean="0">
+                <a:latin typeface="Arial" panose="020B0604020202020204" pitchFamily="34" charset="0"/>
+                <a:cs typeface="Arial" panose="020B0604020202020204" pitchFamily="34" charset="0"/>
+              </a:rPr>
+              <a:t>DONE</a:t>
+            </a:r>
+            <a:endParaRPr lang="en-US" sz="1600" b="1" dirty="0">
+              <a:latin typeface="Arial" panose="020B0604020202020204" pitchFamily="34" charset="0"/>
+              <a:cs typeface="Arial" panose="020B0604020202020204" pitchFamily="34" charset="0"/>
+            </a:endParaRPr>
+          </a:p>
+        </p:txBody>
+      </p:sp>
+      <p:cxnSp>
+        <p:nvCxnSpPr>
+          <p:cNvPr id="19" name="Straight Arrow Connector 18"/>
+          <p:cNvCxnSpPr>
+            <a:stCxn id="5" idx="2"/>
+            <a:endCxn id="11" idx="0"/>
+          </p:cNvCxnSpPr>
+          <p:nvPr/>
+        </p:nvCxnSpPr>
+        <p:spPr>
+          <a:xfrm>
+            <a:off x="1558599" y="2577196"/>
+            <a:ext cx="1571107" cy="566718"/>
+          </a:xfrm>
+          <a:prstGeom prst="straightConnector1">
+            <a:avLst/>
+          </a:prstGeom>
+          <a:ln>
+            <a:solidFill>
+              <a:schemeClr val="tx1"/>
+            </a:solidFill>
+            <a:headEnd w="lg" len="lg"/>
+            <a:tailEnd type="stealth"/>
+          </a:ln>
+        </p:spPr>
+        <p:style>
+          <a:lnRef idx="1">
+            <a:schemeClr val="accent1"/>
+          </a:lnRef>
+          <a:fillRef idx="0">
+            <a:schemeClr val="accent1"/>
+          </a:fillRef>
+          <a:effectRef idx="0">
+            <a:schemeClr val="accent1"/>
+          </a:effectRef>
+          <a:fontRef idx="minor">
+            <a:schemeClr val="tx1"/>
+          </a:fontRef>
+        </p:style>
+      </p:cxnSp>
+      <p:cxnSp>
+        <p:nvCxnSpPr>
+          <p:cNvPr id="20" name="Straight Arrow Connector 19"/>
+          <p:cNvCxnSpPr>
+            <a:stCxn id="5" idx="2"/>
+            <a:endCxn id="16" idx="0"/>
+          </p:cNvCxnSpPr>
+          <p:nvPr/>
+        </p:nvCxnSpPr>
+        <p:spPr>
+          <a:xfrm flipH="1">
+            <a:off x="265970" y="2577196"/>
+            <a:ext cx="1292629" cy="566718"/>
+          </a:xfrm>
+          <a:prstGeom prst="straightConnector1">
+            <a:avLst/>
+          </a:prstGeom>
+          <a:ln>
+            <a:solidFill>
+              <a:schemeClr val="tx1"/>
+            </a:solidFill>
+            <a:headEnd w="lg" len="lg"/>
+            <a:tailEnd type="stealth"/>
+          </a:ln>
+        </p:spPr>
+        <p:style>
+          <a:lnRef idx="1">
+            <a:schemeClr val="accent1"/>
+          </a:lnRef>
+          <a:fillRef idx="0">
+            <a:schemeClr val="accent1"/>
+          </a:fillRef>
+          <a:effectRef idx="0">
+            <a:schemeClr val="accent1"/>
+          </a:effectRef>
+          <a:fontRef idx="minor">
+            <a:schemeClr val="tx1"/>
+          </a:fontRef>
+        </p:style>
+      </p:cxnSp>
+      <p:cxnSp>
+        <p:nvCxnSpPr>
+          <p:cNvPr id="24" name="Straight Arrow Connector 23"/>
+          <p:cNvCxnSpPr>
+            <a:stCxn id="11" idx="2"/>
+            <a:endCxn id="12" idx="0"/>
+          </p:cNvCxnSpPr>
+          <p:nvPr/>
+        </p:nvCxnSpPr>
+        <p:spPr>
+          <a:xfrm>
+            <a:off x="3129706" y="3790245"/>
+            <a:ext cx="0" cy="459309"/>
+          </a:xfrm>
+          <a:prstGeom prst="straightConnector1">
+            <a:avLst/>
+          </a:prstGeom>
+          <a:ln>
+            <a:solidFill>
+              <a:schemeClr val="tx1"/>
+            </a:solidFill>
+            <a:headEnd w="lg" len="lg"/>
+            <a:tailEnd type="stealth"/>
+          </a:ln>
+        </p:spPr>
+        <p:style>
+          <a:lnRef idx="1">
+            <a:schemeClr val="accent1"/>
+          </a:lnRef>
+          <a:fillRef idx="0">
+            <a:schemeClr val="accent1"/>
+          </a:fillRef>
+          <a:effectRef idx="0">
+            <a:schemeClr val="accent1"/>
+          </a:effectRef>
+          <a:fontRef idx="minor">
+            <a:schemeClr val="tx1"/>
+          </a:fontRef>
+        </p:style>
+      </p:cxnSp>
+      <p:cxnSp>
+        <p:nvCxnSpPr>
+          <p:cNvPr id="27" name="Straight Arrow Connector 26"/>
+          <p:cNvCxnSpPr>
+            <a:stCxn id="12" idx="2"/>
+            <a:endCxn id="13" idx="0"/>
+          </p:cNvCxnSpPr>
+          <p:nvPr/>
+        </p:nvCxnSpPr>
+        <p:spPr>
+          <a:xfrm>
+            <a:off x="3129706" y="4895885"/>
+            <a:ext cx="0" cy="459309"/>
+          </a:xfrm>
+          <a:prstGeom prst="straightConnector1">
+            <a:avLst/>
+          </a:prstGeom>
+          <a:ln>
+            <a:solidFill>
+              <a:schemeClr val="tx1"/>
+            </a:solidFill>
+            <a:headEnd w="lg" len="lg"/>
+            <a:tailEnd type="stealth"/>
+          </a:ln>
+        </p:spPr>
+        <p:style>
+          <a:lnRef idx="1">
+            <a:schemeClr val="accent1"/>
+          </a:lnRef>
+          <a:fillRef idx="0">
+            <a:schemeClr val="accent1"/>
+          </a:fillRef>
+          <a:effectRef idx="0">
+            <a:schemeClr val="accent1"/>
+          </a:effectRef>
+          <a:fontRef idx="minor">
+            <a:schemeClr val="tx1"/>
+          </a:fontRef>
+        </p:style>
+      </p:cxnSp>
+      <p:cxnSp>
+        <p:nvCxnSpPr>
+          <p:cNvPr id="30" name="Straight Arrow Connector 29"/>
+          <p:cNvCxnSpPr>
+            <a:stCxn id="13" idx="2"/>
+            <a:endCxn id="17" idx="0"/>
+          </p:cNvCxnSpPr>
+          <p:nvPr/>
+        </p:nvCxnSpPr>
+        <p:spPr>
+          <a:xfrm>
+            <a:off x="3129706" y="6001525"/>
+            <a:ext cx="0" cy="459309"/>
+          </a:xfrm>
+          <a:prstGeom prst="straightConnector1">
+            <a:avLst/>
+          </a:prstGeom>
+          <a:ln>
+            <a:solidFill>
+              <a:schemeClr val="tx1"/>
+            </a:solidFill>
+            <a:headEnd w="lg" len="lg"/>
+            <a:tailEnd type="stealth"/>
+          </a:ln>
+        </p:spPr>
+        <p:style>
+          <a:lnRef idx="1">
+            <a:schemeClr val="accent1"/>
+          </a:lnRef>
+          <a:fillRef idx="0">
+            <a:schemeClr val="accent1"/>
+          </a:fillRef>
+          <a:effectRef idx="0">
+            <a:schemeClr val="accent1"/>
+          </a:effectRef>
+          <a:fontRef idx="minor">
+            <a:schemeClr val="tx1"/>
+          </a:fontRef>
+        </p:style>
+      </p:cxnSp>
+      <p:cxnSp>
+        <p:nvCxnSpPr>
+          <p:cNvPr id="33" name="Straight Arrow Connector 32"/>
+          <p:cNvCxnSpPr>
+            <a:stCxn id="4" idx="2"/>
+            <a:endCxn id="5" idx="0"/>
+          </p:cNvCxnSpPr>
+          <p:nvPr/>
+        </p:nvCxnSpPr>
+        <p:spPr>
+          <a:xfrm>
+            <a:off x="1558599" y="1578965"/>
+            <a:ext cx="0" cy="351900"/>
+          </a:xfrm>
+          <a:prstGeom prst="straightConnector1">
+            <a:avLst/>
+          </a:prstGeom>
+          <a:ln>
+            <a:solidFill>
+              <a:schemeClr val="tx1"/>
+            </a:solidFill>
+            <a:headEnd w="lg" len="lg"/>
+            <a:tailEnd type="stealth"/>
+          </a:ln>
+        </p:spPr>
+        <p:style>
+          <a:lnRef idx="1">
+            <a:schemeClr val="accent1"/>
+          </a:lnRef>
+          <a:fillRef idx="0">
+            <a:schemeClr val="accent1"/>
+          </a:fillRef>
+          <a:effectRef idx="0">
+            <a:schemeClr val="accent1"/>
+          </a:effectRef>
+          <a:fontRef idx="minor">
+            <a:schemeClr val="tx1"/>
+          </a:fontRef>
+        </p:style>
+      </p:cxnSp>
+      <p:cxnSp>
+        <p:nvCxnSpPr>
+          <p:cNvPr id="37" name="Elbow Connector 36"/>
+          <p:cNvCxnSpPr>
+            <a:stCxn id="13" idx="1"/>
+            <a:endCxn id="11" idx="1"/>
+          </p:cNvCxnSpPr>
+          <p:nvPr/>
+        </p:nvCxnSpPr>
+        <p:spPr>
+          <a:xfrm rot="10800000">
+            <a:off x="1895266" y="3467080"/>
+            <a:ext cx="12700" cy="2211280"/>
+          </a:xfrm>
+          <a:prstGeom prst="bentConnector3">
+            <a:avLst>
+              <a:gd name="adj1" fmla="val 2781819"/>
+            </a:avLst>
+          </a:prstGeom>
+          <a:ln>
+            <a:solidFill>
+              <a:schemeClr val="tx1"/>
+            </a:solidFill>
+            <a:headEnd type="none"/>
+            <a:tailEnd type="stealth"/>
+          </a:ln>
+        </p:spPr>
+        <p:style>
+          <a:lnRef idx="1">
+            <a:schemeClr val="accent1"/>
+          </a:lnRef>
+          <a:fillRef idx="0">
+            <a:schemeClr val="accent1"/>
+          </a:fillRef>
+          <a:effectRef idx="0">
+            <a:schemeClr val="accent1"/>
+          </a:effectRef>
+          <a:fontRef idx="minor">
+            <a:schemeClr val="tx1"/>
+          </a:fontRef>
+        </p:style>
+      </p:cxnSp>
+      <p:sp>
+        <p:nvSpPr>
+          <p:cNvPr id="41" name="TextBox 40"/>
+          <p:cNvSpPr txBox="1"/>
+          <p:nvPr/>
+        </p:nvSpPr>
+        <p:spPr>
+          <a:xfrm>
+            <a:off x="7083718" y="872121"/>
+            <a:ext cx="1412582" cy="369332"/>
+          </a:xfrm>
+          <a:prstGeom prst="rect">
+            <a:avLst/>
+          </a:prstGeom>
+          <a:noFill/>
+        </p:spPr>
+        <p:txBody>
+          <a:bodyPr wrap="square" rtlCol="0">
+            <a:spAutoFit/>
+          </a:bodyPr>
+          <a:lstStyle/>
+          <a:p>
+            <a:pPr algn="ctr"/>
+            <a:r>
+              <a:rPr lang="en-US" dirty="0" smtClean="0">
+                <a:latin typeface="Arial" panose="020B0604020202020204" pitchFamily="34" charset="0"/>
+                <a:cs typeface="Arial" panose="020B0604020202020204" pitchFamily="34" charset="0"/>
+              </a:rPr>
+              <a:t>Skewness</a:t>
+            </a:r>
+            <a:endParaRPr lang="en-US" dirty="0">
+              <a:latin typeface="Arial" panose="020B0604020202020204" pitchFamily="34" charset="0"/>
+              <a:cs typeface="Arial" panose="020B0604020202020204" pitchFamily="34" charset="0"/>
+            </a:endParaRPr>
+          </a:p>
+        </p:txBody>
+      </p:sp>
+      <p:sp>
+        <p:nvSpPr>
+          <p:cNvPr id="42" name="TextBox 41"/>
+          <p:cNvSpPr txBox="1"/>
+          <p:nvPr/>
+        </p:nvSpPr>
+        <p:spPr>
+          <a:xfrm rot="16200000">
+            <a:off x="3984305" y="3008449"/>
+            <a:ext cx="2948152" cy="369332"/>
+          </a:xfrm>
+          <a:prstGeom prst="rect">
+            <a:avLst/>
+          </a:prstGeom>
+          <a:noFill/>
+        </p:spPr>
+        <p:txBody>
+          <a:bodyPr wrap="square" rtlCol="0">
+            <a:spAutoFit/>
+          </a:bodyPr>
+          <a:lstStyle/>
+          <a:p>
+            <a:pPr algn="ctr"/>
+            <a:r>
+              <a:rPr lang="en-US" dirty="0" smtClean="0">
+                <a:latin typeface="Arial" panose="020B0604020202020204" pitchFamily="34" charset="0"/>
+                <a:cs typeface="Arial" panose="020B0604020202020204" pitchFamily="34" charset="0"/>
+              </a:rPr>
+              <a:t>Kurtosis</a:t>
+            </a:r>
+            <a:endParaRPr lang="en-US" dirty="0">
+              <a:latin typeface="Arial" panose="020B0604020202020204" pitchFamily="34" charset="0"/>
+              <a:cs typeface="Arial" panose="020B0604020202020204" pitchFamily="34" charset="0"/>
+            </a:endParaRPr>
+          </a:p>
+        </p:txBody>
+      </p:sp>
+      <p:graphicFrame>
+        <p:nvGraphicFramePr>
+          <p:cNvPr id="2" name="Table 1"/>
+          <p:cNvGraphicFramePr>
+            <a:graphicFrameLocks noGrp="1"/>
+          </p:cNvGraphicFramePr>
+          <p:nvPr>
+            <p:extLst>
+              <p:ext uri="{D42A27DB-BD31-4B8C-83A1-F6EECF244321}">
+                <p14:modId xmlns:p14="http://schemas.microsoft.com/office/powerpoint/2010/main" val="1744599731"/>
+              </p:ext>
+            </p:extLst>
+          </p:nvPr>
+        </p:nvGraphicFramePr>
+        <p:xfrm>
+          <a:off x="5695378" y="1258886"/>
+          <a:ext cx="3973715" cy="4108609"/>
+        </p:xfrm>
+        <a:graphic>
+          <a:graphicData uri="http://schemas.openxmlformats.org/drawingml/2006/table">
+            <a:tbl>
+              <a:tblPr firstRow="1" bandRow="1">
+                <a:tableStyleId>{5940675A-B579-460E-94D1-54222C63F5DA}</a:tableStyleId>
+              </a:tblPr>
+              <a:tblGrid>
+                <a:gridCol w="852245">
+                  <a:extLst>
+                    <a:ext uri="{9D8B030D-6E8A-4147-A177-3AD203B41FA5}">
+                      <a16:colId xmlns:a16="http://schemas.microsoft.com/office/drawing/2014/main" val="1625646075"/>
+                    </a:ext>
+                  </a:extLst>
+                </a:gridCol>
+                <a:gridCol w="1545843">
+                  <a:extLst>
+                    <a:ext uri="{9D8B030D-6E8A-4147-A177-3AD203B41FA5}">
+                      <a16:colId xmlns:a16="http://schemas.microsoft.com/office/drawing/2014/main" val="872546237"/>
+                    </a:ext>
+                  </a:extLst>
+                </a:gridCol>
+                <a:gridCol w="1575627">
+                  <a:extLst>
+                    <a:ext uri="{9D8B030D-6E8A-4147-A177-3AD203B41FA5}">
+                      <a16:colId xmlns:a16="http://schemas.microsoft.com/office/drawing/2014/main" val="3333672044"/>
+                    </a:ext>
+                  </a:extLst>
+                </a:gridCol>
+              </a:tblGrid>
+              <a:tr h="550316">
+                <a:tc>
+                  <a:txBody>
+                    <a:bodyPr/>
+                    <a:lstStyle/>
+                    <a:p>
+                      <a:endParaRPr lang="en-US" sz="1400" dirty="0">
+                        <a:latin typeface="Arial" panose="020B0604020202020204" pitchFamily="34" charset="0"/>
+                        <a:cs typeface="Arial" panose="020B0604020202020204" pitchFamily="34" charset="0"/>
+                      </a:endParaRPr>
+                    </a:p>
+                  </a:txBody>
+                  <a:tcPr vert="vert270"/>
+                </a:tc>
+                <a:tc>
+                  <a:txBody>
+                    <a:bodyPr/>
+                    <a:lstStyle/>
+                    <a:p>
+                      <a:r>
+                        <a:rPr lang="en-US" sz="1400" dirty="0" smtClean="0">
+                          <a:latin typeface="Arial" panose="020B0604020202020204" pitchFamily="34" charset="0"/>
+                          <a:cs typeface="Arial" panose="020B0604020202020204" pitchFamily="34" charset="0"/>
+                        </a:rPr>
+                        <a:t>No</a:t>
+                      </a:r>
+                      <a:r>
+                        <a:rPr lang="en-US" sz="1400" baseline="0" dirty="0" smtClean="0">
+                          <a:latin typeface="Arial" panose="020B0604020202020204" pitchFamily="34" charset="0"/>
+                          <a:cs typeface="Arial" panose="020B0604020202020204" pitchFamily="34" charset="0"/>
+                        </a:rPr>
+                        <a:t> skew</a:t>
+                      </a:r>
+                      <a:endParaRPr lang="en-US" sz="1400" dirty="0">
+                        <a:latin typeface="Arial" panose="020B0604020202020204" pitchFamily="34" charset="0"/>
+                        <a:cs typeface="Arial" panose="020B0604020202020204" pitchFamily="34" charset="0"/>
+                      </a:endParaRPr>
+                    </a:p>
+                  </a:txBody>
+                  <a:tcPr/>
+                </a:tc>
+                <a:tc>
+                  <a:txBody>
+                    <a:bodyPr/>
+                    <a:lstStyle/>
+                    <a:p>
+                      <a:r>
+                        <a:rPr lang="en-US" sz="1400" dirty="0" smtClean="0">
+                          <a:latin typeface="Arial" panose="020B0604020202020204" pitchFamily="34" charset="0"/>
+                          <a:cs typeface="Arial" panose="020B0604020202020204" pitchFamily="34" charset="0"/>
+                        </a:rPr>
+                        <a:t>Negative ↔ positive skew</a:t>
+                      </a:r>
+                      <a:endParaRPr lang="en-US" sz="1400" dirty="0">
+                        <a:latin typeface="Arial" panose="020B0604020202020204" pitchFamily="34" charset="0"/>
+                        <a:cs typeface="Arial" panose="020B0604020202020204" pitchFamily="34" charset="0"/>
+                      </a:endParaRPr>
+                    </a:p>
+                  </a:txBody>
+                  <a:tcPr/>
+                </a:tc>
+                <a:extLst>
+                  <a:ext uri="{0D108BD9-81ED-4DB2-BD59-A6C34878D82A}">
+                    <a16:rowId xmlns:a16="http://schemas.microsoft.com/office/drawing/2014/main" val="1548583708"/>
+                  </a:ext>
+                </a:extLst>
+              </a:tr>
+              <a:tr h="1028453">
+                <a:tc>
+                  <a:txBody>
+                    <a:bodyPr/>
+                    <a:lstStyle/>
+                    <a:p>
+                      <a:r>
+                        <a:rPr lang="en-US" sz="1400" dirty="0" err="1" smtClean="0">
+                          <a:latin typeface="Arial" panose="020B0604020202020204" pitchFamily="34" charset="0"/>
+                          <a:cs typeface="Arial" panose="020B0604020202020204" pitchFamily="34" charset="0"/>
+                        </a:rPr>
+                        <a:t>Mesokurtic</a:t>
+                      </a:r>
+                      <a:endParaRPr lang="en-US" sz="1400" dirty="0">
+                        <a:latin typeface="Arial" panose="020B0604020202020204" pitchFamily="34" charset="0"/>
+                        <a:cs typeface="Arial" panose="020B0604020202020204" pitchFamily="34" charset="0"/>
+                      </a:endParaRPr>
+                    </a:p>
+                  </a:txBody>
+                  <a:tcPr vert="vert270"/>
+                </a:tc>
+                <a:tc>
+                  <a:txBody>
+                    <a:bodyPr/>
+                    <a:lstStyle/>
+                    <a:p>
+                      <a:pPr marL="285750" indent="-285750">
+                        <a:buFont typeface="Arial" panose="020B0604020202020204" pitchFamily="34" charset="0"/>
+                        <a:buChar char="•"/>
+                      </a:pPr>
+                      <a:r>
+                        <a:rPr lang="en-US" sz="1400" dirty="0" smtClean="0">
+                          <a:latin typeface="Arial" panose="020B0604020202020204" pitchFamily="34" charset="0"/>
+                          <a:cs typeface="Arial" panose="020B0604020202020204" pitchFamily="34" charset="0"/>
+                        </a:rPr>
+                        <a:t>Normal</a:t>
+                      </a:r>
+                      <a:endParaRPr lang="en-US" sz="1400" dirty="0">
+                        <a:latin typeface="Arial" panose="020B0604020202020204" pitchFamily="34" charset="0"/>
+                        <a:cs typeface="Arial" panose="020B0604020202020204" pitchFamily="34" charset="0"/>
+                      </a:endParaRPr>
+                    </a:p>
+                  </a:txBody>
+                  <a:tcPr/>
+                </a:tc>
+                <a:tc>
+                  <a:txBody>
+                    <a:bodyPr/>
+                    <a:lstStyle/>
+                    <a:p>
+                      <a:pPr marL="285750" indent="-285750">
+                        <a:buFont typeface="Arial" panose="020B0604020202020204" pitchFamily="34" charset="0"/>
+                        <a:buChar char="•"/>
+                      </a:pPr>
+                      <a:r>
+                        <a:rPr lang="en-US" sz="1400" dirty="0" smtClean="0">
+                          <a:latin typeface="Arial" panose="020B0604020202020204" pitchFamily="34" charset="0"/>
+                          <a:cs typeface="Arial" panose="020B0604020202020204" pitchFamily="34" charset="0"/>
+                        </a:rPr>
+                        <a:t>Skewed normal</a:t>
+                      </a:r>
+                      <a:endParaRPr lang="en-US" sz="1400" dirty="0">
+                        <a:latin typeface="Arial" panose="020B0604020202020204" pitchFamily="34" charset="0"/>
+                        <a:cs typeface="Arial" panose="020B0604020202020204" pitchFamily="34" charset="0"/>
+                      </a:endParaRPr>
+                    </a:p>
+                  </a:txBody>
+                  <a:tcPr/>
+                </a:tc>
+                <a:extLst>
+                  <a:ext uri="{0D108BD9-81ED-4DB2-BD59-A6C34878D82A}">
+                    <a16:rowId xmlns:a16="http://schemas.microsoft.com/office/drawing/2014/main" val="3138035552"/>
+                  </a:ext>
+                </a:extLst>
+              </a:tr>
+              <a:tr h="1010942">
+                <a:tc>
+                  <a:txBody>
+                    <a:bodyPr/>
+                    <a:lstStyle/>
+                    <a:p>
+                      <a:r>
+                        <a:rPr lang="en-US" sz="1400" dirty="0" smtClean="0">
+                          <a:latin typeface="Arial" panose="020B0604020202020204" pitchFamily="34" charset="0"/>
+                          <a:cs typeface="Arial" panose="020B0604020202020204" pitchFamily="34" charset="0"/>
+                        </a:rPr>
+                        <a:t>Leptokurtic</a:t>
+                      </a:r>
+                      <a:endParaRPr lang="en-US" sz="1400" dirty="0">
+                        <a:latin typeface="Arial" panose="020B0604020202020204" pitchFamily="34" charset="0"/>
+                        <a:cs typeface="Arial" panose="020B0604020202020204" pitchFamily="34" charset="0"/>
+                      </a:endParaRPr>
+                    </a:p>
+                  </a:txBody>
+                  <a:tcPr vert="vert270"/>
+                </a:tc>
+                <a:tc>
+                  <a:txBody>
+                    <a:bodyPr/>
+                    <a:lstStyle/>
+                    <a:p>
+                      <a:pPr marL="285750" marR="0" lvl="0" indent="-285750" algn="l" defTabSz="914400" rtl="0" eaLnBrk="1" fontAlgn="auto" latinLnBrk="0" hangingPunct="1">
+                        <a:lnSpc>
+                          <a:spcPct val="100000"/>
+                        </a:lnSpc>
+                        <a:spcBef>
+                          <a:spcPts val="0"/>
+                        </a:spcBef>
+                        <a:spcAft>
+                          <a:spcPts val="0"/>
+                        </a:spcAft>
+                        <a:buClrTx/>
+                        <a:buSzTx/>
+                        <a:buFont typeface="Arial" panose="020B0604020202020204" pitchFamily="34" charset="0"/>
+                        <a:buChar char="•"/>
+                        <a:tabLst/>
+                        <a:defRPr/>
+                      </a:pPr>
+                      <a:r>
+                        <a:rPr lang="en-US" sz="1400" i="1" dirty="0" smtClean="0">
+                          <a:latin typeface="Arial" panose="020B0604020202020204" pitchFamily="34" charset="0"/>
+                          <a:cs typeface="Arial" panose="020B0604020202020204" pitchFamily="34" charset="0"/>
+                        </a:rPr>
+                        <a:t>t</a:t>
+                      </a:r>
+                      <a:r>
+                        <a:rPr lang="en-US" sz="1400" i="0" dirty="0" smtClean="0">
+                          <a:latin typeface="Arial" panose="020B0604020202020204" pitchFamily="34" charset="0"/>
+                          <a:cs typeface="Arial" panose="020B0604020202020204" pitchFamily="34" charset="0"/>
+                        </a:rPr>
+                        <a:t> distribution</a:t>
+                      </a:r>
+                    </a:p>
+                    <a:p>
+                      <a:pPr marL="285750" marR="0" lvl="0" indent="-285750" algn="l" defTabSz="914400" rtl="0" eaLnBrk="1" fontAlgn="auto" latinLnBrk="0" hangingPunct="1">
+                        <a:lnSpc>
+                          <a:spcPct val="100000"/>
+                        </a:lnSpc>
+                        <a:spcBef>
+                          <a:spcPts val="0"/>
+                        </a:spcBef>
+                        <a:spcAft>
+                          <a:spcPts val="0"/>
+                        </a:spcAft>
+                        <a:buClrTx/>
+                        <a:buSzTx/>
+                        <a:buFont typeface="Arial" panose="020B0604020202020204" pitchFamily="34" charset="0"/>
+                        <a:buChar char="•"/>
+                        <a:tabLst/>
+                        <a:defRPr/>
+                      </a:pPr>
+                      <a:r>
+                        <a:rPr lang="en-US" sz="1400" i="0" dirty="0" smtClean="0">
+                          <a:latin typeface="Arial" panose="020B0604020202020204" pitchFamily="34" charset="0"/>
+                          <a:cs typeface="Arial" panose="020B0604020202020204" pitchFamily="34" charset="0"/>
+                        </a:rPr>
+                        <a:t>Generalized</a:t>
+                      </a:r>
+                      <a:r>
+                        <a:rPr lang="en-US" sz="1400" i="0" baseline="0" dirty="0" smtClean="0">
+                          <a:latin typeface="Arial" panose="020B0604020202020204" pitchFamily="34" charset="0"/>
+                          <a:cs typeface="Arial" panose="020B0604020202020204" pitchFamily="34" charset="0"/>
+                        </a:rPr>
+                        <a:t> </a:t>
+                      </a:r>
+                      <a:r>
+                        <a:rPr lang="en-US" sz="1400" i="1" baseline="0" dirty="0" smtClean="0">
+                          <a:latin typeface="Arial" panose="020B0604020202020204" pitchFamily="34" charset="0"/>
+                          <a:cs typeface="Arial" panose="020B0604020202020204" pitchFamily="34" charset="0"/>
+                        </a:rPr>
+                        <a:t>t</a:t>
+                      </a:r>
+                    </a:p>
+                    <a:p>
+                      <a:pPr marL="285750" marR="0" lvl="0" indent="-285750" algn="l" defTabSz="914400" rtl="0" eaLnBrk="1" fontAlgn="auto" latinLnBrk="0" hangingPunct="1">
+                        <a:lnSpc>
+                          <a:spcPct val="100000"/>
+                        </a:lnSpc>
+                        <a:spcBef>
+                          <a:spcPts val="0"/>
+                        </a:spcBef>
+                        <a:spcAft>
+                          <a:spcPts val="0"/>
+                        </a:spcAft>
+                        <a:buClrTx/>
+                        <a:buSzTx/>
+                        <a:buFont typeface="Arial" panose="020B0604020202020204" pitchFamily="34" charset="0"/>
+                        <a:buChar char="•"/>
+                        <a:tabLst/>
+                        <a:defRPr/>
+                      </a:pPr>
+                      <a:r>
+                        <a:rPr lang="en-US" sz="1400" i="0" baseline="0" dirty="0" smtClean="0">
+                          <a:latin typeface="Arial" panose="020B0604020202020204" pitchFamily="34" charset="0"/>
+                          <a:cs typeface="Arial" panose="020B0604020202020204" pitchFamily="34" charset="0"/>
+                        </a:rPr>
+                        <a:t>Logistic</a:t>
+                      </a:r>
+                    </a:p>
+                    <a:p>
+                      <a:pPr marL="285750" marR="0" lvl="0" indent="-285750" algn="l" defTabSz="914400" rtl="0" eaLnBrk="1" fontAlgn="auto" latinLnBrk="0" hangingPunct="1">
+                        <a:lnSpc>
+                          <a:spcPct val="100000"/>
+                        </a:lnSpc>
+                        <a:spcBef>
+                          <a:spcPts val="0"/>
+                        </a:spcBef>
+                        <a:spcAft>
+                          <a:spcPts val="0"/>
+                        </a:spcAft>
+                        <a:buClrTx/>
+                        <a:buSzTx/>
+                        <a:buFont typeface="Arial" panose="020B0604020202020204" pitchFamily="34" charset="0"/>
+                        <a:buChar char="•"/>
+                        <a:tabLst/>
+                        <a:defRPr/>
+                      </a:pPr>
+                      <a:r>
+                        <a:rPr lang="en-US" sz="1400" i="0" baseline="0" dirty="0" smtClean="0">
+                          <a:latin typeface="Arial" panose="020B0604020202020204" pitchFamily="34" charset="0"/>
+                          <a:cs typeface="Arial" panose="020B0604020202020204" pitchFamily="34" charset="0"/>
+                        </a:rPr>
+                        <a:t>Normal-Exponential-</a:t>
+                      </a:r>
+                      <a:r>
+                        <a:rPr lang="en-US" sz="1400" i="1" baseline="0" dirty="0" smtClean="0">
+                          <a:latin typeface="Arial" panose="020B0604020202020204" pitchFamily="34" charset="0"/>
+                          <a:cs typeface="Arial" panose="020B0604020202020204" pitchFamily="34" charset="0"/>
+                        </a:rPr>
+                        <a:t>t</a:t>
+                      </a:r>
+                    </a:p>
+                  </a:txBody>
+                  <a:tcPr/>
+                </a:tc>
+                <a:tc>
+                  <a:txBody>
+                    <a:bodyPr/>
+                    <a:lstStyle/>
+                    <a:p>
+                      <a:pPr marL="285750" indent="-285750">
+                        <a:buFont typeface="Arial" panose="020B0604020202020204" pitchFamily="34" charset="0"/>
+                        <a:buChar char="•"/>
+                      </a:pPr>
+                      <a:r>
+                        <a:rPr lang="en-US" sz="1400" i="1" dirty="0" smtClean="0">
+                          <a:latin typeface="Arial" panose="020B0604020202020204" pitchFamily="34" charset="0"/>
+                          <a:cs typeface="Arial" panose="020B0604020202020204" pitchFamily="34" charset="0"/>
+                        </a:rPr>
+                        <a:t>t</a:t>
+                      </a:r>
+                      <a:r>
+                        <a:rPr lang="en-US" sz="1400" i="0" dirty="0" smtClean="0">
+                          <a:latin typeface="Arial" panose="020B0604020202020204" pitchFamily="34" charset="0"/>
+                          <a:cs typeface="Arial" panose="020B0604020202020204" pitchFamily="34" charset="0"/>
+                        </a:rPr>
+                        <a:t> distribution</a:t>
+                      </a:r>
+                    </a:p>
+                    <a:p>
+                      <a:pPr marL="285750" indent="-285750">
+                        <a:buFont typeface="Arial" panose="020B0604020202020204" pitchFamily="34" charset="0"/>
+                        <a:buChar char="•"/>
+                      </a:pPr>
+                      <a:r>
+                        <a:rPr lang="en-US" sz="1400" i="0" dirty="0" smtClean="0">
+                          <a:latin typeface="Arial" panose="020B0604020202020204" pitchFamily="34" charset="0"/>
+                          <a:cs typeface="Arial" panose="020B0604020202020204" pitchFamily="34" charset="0"/>
+                        </a:rPr>
+                        <a:t>Exponential-Generalized Beta</a:t>
+                      </a:r>
+                    </a:p>
+                    <a:p>
+                      <a:pPr marL="285750" indent="-285750">
+                        <a:buFont typeface="Arial" panose="020B0604020202020204" pitchFamily="34" charset="0"/>
+                        <a:buChar char="•"/>
+                      </a:pPr>
+                      <a:r>
+                        <a:rPr lang="en-US" sz="1400" i="0" dirty="0" smtClean="0">
+                          <a:latin typeface="Arial" panose="020B0604020202020204" pitchFamily="34" charset="0"/>
+                          <a:cs typeface="Arial" panose="020B0604020202020204" pitchFamily="34" charset="0"/>
+                        </a:rPr>
+                        <a:t>Johnson’s S</a:t>
+                      </a:r>
+                      <a:r>
+                        <a:rPr lang="en-US" sz="1400" i="0" baseline="-25000" dirty="0" smtClean="0">
+                          <a:latin typeface="Arial" panose="020B0604020202020204" pitchFamily="34" charset="0"/>
+                          <a:cs typeface="Arial" panose="020B0604020202020204" pitchFamily="34" charset="0"/>
+                        </a:rPr>
+                        <a:t>U</a:t>
+                      </a:r>
+                      <a:endParaRPr lang="en-US" sz="1400" i="1" baseline="-25000" dirty="0">
+                        <a:latin typeface="Arial" panose="020B0604020202020204" pitchFamily="34" charset="0"/>
+                        <a:cs typeface="Arial" panose="020B0604020202020204" pitchFamily="34" charset="0"/>
+                      </a:endParaRPr>
+                    </a:p>
+                  </a:txBody>
+                  <a:tcPr/>
+                </a:tc>
+                <a:extLst>
+                  <a:ext uri="{0D108BD9-81ED-4DB2-BD59-A6C34878D82A}">
+                    <a16:rowId xmlns:a16="http://schemas.microsoft.com/office/drawing/2014/main" val="793838438"/>
+                  </a:ext>
+                </a:extLst>
+              </a:tr>
+              <a:tr h="1151564">
+                <a:tc>
+                  <a:txBody>
+                    <a:bodyPr/>
+                    <a:lstStyle/>
+                    <a:p>
+                      <a:r>
+                        <a:rPr lang="en-US" sz="1400" dirty="0" err="1" smtClean="0">
+                          <a:latin typeface="Arial" panose="020B0604020202020204" pitchFamily="34" charset="0"/>
+                          <a:cs typeface="Arial" panose="020B0604020202020204" pitchFamily="34" charset="0"/>
+                        </a:rPr>
+                        <a:t>Platykurtic</a:t>
+                      </a:r>
+                      <a:r>
+                        <a:rPr lang="en-US" sz="1400" dirty="0" smtClean="0">
+                          <a:latin typeface="Arial" panose="020B0604020202020204" pitchFamily="34" charset="0"/>
+                          <a:cs typeface="Arial" panose="020B0604020202020204" pitchFamily="34" charset="0"/>
+                        </a:rPr>
+                        <a:t> ↔ Leptokurtic</a:t>
+                      </a:r>
+                      <a:endParaRPr lang="en-US" sz="1400" dirty="0">
+                        <a:latin typeface="Arial" panose="020B0604020202020204" pitchFamily="34" charset="0"/>
+                        <a:cs typeface="Arial" panose="020B0604020202020204" pitchFamily="34" charset="0"/>
+                      </a:endParaRPr>
+                    </a:p>
+                  </a:txBody>
+                  <a:tcPr vert="vert270"/>
+                </a:tc>
+                <a:tc>
+                  <a:txBody>
+                    <a:bodyPr/>
+                    <a:lstStyle/>
+                    <a:p>
+                      <a:pPr marL="285750" indent="-285750">
+                        <a:buFont typeface="Arial" panose="020B0604020202020204" pitchFamily="34" charset="0"/>
+                        <a:buChar char="•"/>
+                      </a:pPr>
+                      <a:r>
+                        <a:rPr lang="en-US" sz="1400" dirty="0" smtClean="0">
+                          <a:latin typeface="Arial" panose="020B0604020202020204" pitchFamily="34" charset="0"/>
+                          <a:cs typeface="Arial" panose="020B0604020202020204" pitchFamily="34" charset="0"/>
+                        </a:rPr>
+                        <a:t>Power</a:t>
+                      </a:r>
+                      <a:r>
+                        <a:rPr lang="en-US" sz="1400" baseline="0" dirty="0" smtClean="0">
+                          <a:latin typeface="Arial" panose="020B0604020202020204" pitchFamily="34" charset="0"/>
+                          <a:cs typeface="Arial" panose="020B0604020202020204" pitchFamily="34" charset="0"/>
+                        </a:rPr>
+                        <a:t> exponential</a:t>
+                      </a:r>
+                      <a:endParaRPr lang="en-US" sz="1400" dirty="0">
+                        <a:latin typeface="Arial" panose="020B0604020202020204" pitchFamily="34" charset="0"/>
+                        <a:cs typeface="Arial" panose="020B0604020202020204" pitchFamily="34" charset="0"/>
+                      </a:endParaRPr>
+                    </a:p>
+                  </a:txBody>
+                  <a:tcPr/>
+                </a:tc>
+                <a:tc>
+                  <a:txBody>
+                    <a:bodyPr/>
+                    <a:lstStyle/>
+                    <a:p>
+                      <a:pPr marL="285750" indent="-285750">
+                        <a:buFont typeface="Arial" panose="020B0604020202020204" pitchFamily="34" charset="0"/>
+                        <a:buChar char="•"/>
+                      </a:pPr>
+                      <a:r>
+                        <a:rPr lang="en-US" sz="1400" dirty="0" err="1" smtClean="0">
+                          <a:latin typeface="Arial" panose="020B0604020202020204" pitchFamily="34" charset="0"/>
+                          <a:cs typeface="Arial" panose="020B0604020202020204" pitchFamily="34" charset="0"/>
+                        </a:rPr>
+                        <a:t>sinh-arcsinh</a:t>
+                      </a:r>
+                      <a:endParaRPr lang="en-US" sz="1400" dirty="0" smtClean="0">
+                        <a:latin typeface="Arial" panose="020B0604020202020204" pitchFamily="34" charset="0"/>
+                        <a:cs typeface="Arial" panose="020B0604020202020204" pitchFamily="34" charset="0"/>
+                      </a:endParaRPr>
+                    </a:p>
+                    <a:p>
+                      <a:pPr marL="285750" indent="-285750">
+                        <a:buFont typeface="Arial" panose="020B0604020202020204" pitchFamily="34" charset="0"/>
+                        <a:buChar char="•"/>
+                      </a:pPr>
+                      <a:r>
+                        <a:rPr lang="en-US" sz="1400" dirty="0" smtClean="0">
+                          <a:latin typeface="Arial" panose="020B0604020202020204" pitchFamily="34" charset="0"/>
+                          <a:cs typeface="Arial" panose="020B0604020202020204" pitchFamily="34" charset="0"/>
+                        </a:rPr>
+                        <a:t>Skewed power exponential</a:t>
+                      </a:r>
+                    </a:p>
+                    <a:p>
+                      <a:pPr marL="285750" indent="-285750">
+                        <a:buFont typeface="Arial" panose="020B0604020202020204" pitchFamily="34" charset="0"/>
+                        <a:buChar char="•"/>
+                      </a:pPr>
+                      <a:r>
+                        <a:rPr lang="en-US" sz="1400" dirty="0" smtClean="0">
+                          <a:latin typeface="Arial" panose="020B0604020202020204" pitchFamily="34" charset="0"/>
+                          <a:cs typeface="Arial" panose="020B0604020202020204" pitchFamily="34" charset="0"/>
+                        </a:rPr>
+                        <a:t>Skewed generalized </a:t>
+                      </a:r>
+                      <a:r>
+                        <a:rPr lang="en-US" sz="1400" i="1" dirty="0" smtClean="0">
+                          <a:latin typeface="Arial" panose="020B0604020202020204" pitchFamily="34" charset="0"/>
+                          <a:cs typeface="Arial" panose="020B0604020202020204" pitchFamily="34" charset="0"/>
+                        </a:rPr>
+                        <a:t>t</a:t>
+                      </a:r>
+                      <a:endParaRPr lang="en-US" sz="1400" i="1" dirty="0">
+                        <a:latin typeface="Arial" panose="020B0604020202020204" pitchFamily="34" charset="0"/>
+                        <a:cs typeface="Arial" panose="020B0604020202020204" pitchFamily="34" charset="0"/>
+                      </a:endParaRPr>
+                    </a:p>
+                  </a:txBody>
+                  <a:tcPr/>
+                </a:tc>
+                <a:extLst>
+                  <a:ext uri="{0D108BD9-81ED-4DB2-BD59-A6C34878D82A}">
+                    <a16:rowId xmlns:a16="http://schemas.microsoft.com/office/drawing/2014/main" val="354888531"/>
+                  </a:ext>
+                </a:extLst>
+              </a:tr>
+            </a:tbl>
+          </a:graphicData>
+        </a:graphic>
+      </p:graphicFrame>
+      <p:sp>
+        <p:nvSpPr>
+          <p:cNvPr id="3" name="TextBox 2"/>
+          <p:cNvSpPr txBox="1"/>
+          <p:nvPr/>
+        </p:nvSpPr>
+        <p:spPr>
+          <a:xfrm rot="20137366">
+            <a:off x="115007" y="2667486"/>
+            <a:ext cx="1373875" cy="261610"/>
+          </a:xfrm>
+          <a:prstGeom prst="rect">
+            <a:avLst/>
+          </a:prstGeom>
+          <a:noFill/>
+        </p:spPr>
+        <p:txBody>
+          <a:bodyPr wrap="square" rtlCol="0">
+            <a:spAutoFit/>
+          </a:bodyPr>
+          <a:lstStyle/>
+          <a:p>
+            <a:pPr algn="ctr"/>
+            <a:r>
+              <a:rPr lang="en-US" sz="1100" i="1" dirty="0" smtClean="0">
+                <a:latin typeface="Arial" panose="020B0604020202020204" pitchFamily="34" charset="0"/>
+                <a:cs typeface="Arial" panose="020B0604020202020204" pitchFamily="34" charset="0"/>
+              </a:rPr>
+              <a:t>Gaussian</a:t>
+            </a:r>
+            <a:endParaRPr lang="en-US" sz="1100" i="1" dirty="0">
+              <a:latin typeface="Arial" panose="020B0604020202020204" pitchFamily="34" charset="0"/>
+              <a:cs typeface="Arial" panose="020B0604020202020204" pitchFamily="34" charset="0"/>
+            </a:endParaRPr>
+          </a:p>
+        </p:txBody>
+      </p:sp>
+      <p:sp>
+        <p:nvSpPr>
+          <p:cNvPr id="22" name="TextBox 21"/>
+          <p:cNvSpPr txBox="1"/>
+          <p:nvPr/>
+        </p:nvSpPr>
+        <p:spPr>
+          <a:xfrm>
+            <a:off x="2997561" y="872121"/>
+            <a:ext cx="1373875" cy="430887"/>
+          </a:xfrm>
+          <a:prstGeom prst="rect">
+            <a:avLst/>
+          </a:prstGeom>
+          <a:noFill/>
+        </p:spPr>
+        <p:txBody>
+          <a:bodyPr wrap="square" rtlCol="0">
+            <a:spAutoFit/>
+          </a:bodyPr>
+          <a:lstStyle/>
+          <a:p>
+            <a:pPr algn="ctr"/>
+            <a:r>
+              <a:rPr lang="en-US" sz="1100" i="1" dirty="0" smtClean="0">
+                <a:latin typeface="Arial" panose="020B0604020202020204" pitchFamily="34" charset="0"/>
+                <a:cs typeface="Arial" panose="020B0604020202020204" pitchFamily="34" charset="0"/>
+              </a:rPr>
+              <a:t>Fixed-effects model selection</a:t>
+            </a:r>
+            <a:endParaRPr lang="en-US" sz="1100" i="1" dirty="0">
+              <a:latin typeface="Arial" panose="020B0604020202020204" pitchFamily="34" charset="0"/>
+              <a:cs typeface="Arial" panose="020B0604020202020204" pitchFamily="34" charset="0"/>
+            </a:endParaRPr>
+          </a:p>
+        </p:txBody>
+      </p:sp>
+      <p:sp>
+        <p:nvSpPr>
+          <p:cNvPr id="28" name="TextBox 27"/>
+          <p:cNvSpPr txBox="1"/>
+          <p:nvPr/>
+        </p:nvSpPr>
+        <p:spPr>
+          <a:xfrm>
+            <a:off x="3129705" y="5983781"/>
+            <a:ext cx="1343030" cy="600164"/>
+          </a:xfrm>
+          <a:prstGeom prst="rect">
+            <a:avLst/>
+          </a:prstGeom>
+          <a:noFill/>
+        </p:spPr>
+        <p:txBody>
+          <a:bodyPr wrap="square" rtlCol="0">
+            <a:spAutoFit/>
+          </a:bodyPr>
+          <a:lstStyle/>
+          <a:p>
+            <a:pPr algn="ctr"/>
+            <a:r>
+              <a:rPr lang="en-US" sz="1100" i="1" dirty="0" smtClean="0">
+                <a:latin typeface="Arial" panose="020B0604020202020204" pitchFamily="34" charset="0"/>
+                <a:cs typeface="Arial" panose="020B0604020202020204" pitchFamily="34" charset="0"/>
+              </a:rPr>
+              <a:t>Simulated data are consistent with real data</a:t>
+            </a:r>
+            <a:endParaRPr lang="en-US" sz="1100" i="1" dirty="0">
+              <a:latin typeface="Arial" panose="020B0604020202020204" pitchFamily="34" charset="0"/>
+              <a:cs typeface="Arial" panose="020B0604020202020204" pitchFamily="34" charset="0"/>
+            </a:endParaRPr>
+          </a:p>
+        </p:txBody>
+      </p:sp>
+      <p:sp>
+        <p:nvSpPr>
+          <p:cNvPr id="29" name="TextBox 28"/>
+          <p:cNvSpPr txBox="1"/>
+          <p:nvPr/>
+        </p:nvSpPr>
+        <p:spPr>
+          <a:xfrm rot="16200000">
+            <a:off x="447961" y="4420498"/>
+            <a:ext cx="1691392" cy="430887"/>
+          </a:xfrm>
+          <a:prstGeom prst="rect">
+            <a:avLst/>
+          </a:prstGeom>
+          <a:noFill/>
+        </p:spPr>
+        <p:txBody>
+          <a:bodyPr wrap="square" rtlCol="0">
+            <a:spAutoFit/>
+          </a:bodyPr>
+          <a:lstStyle/>
+          <a:p>
+            <a:pPr algn="ctr"/>
+            <a:r>
+              <a:rPr lang="en-US" sz="1100" i="1" dirty="0" smtClean="0">
+                <a:latin typeface="Arial" panose="020B0604020202020204" pitchFamily="34" charset="0"/>
+                <a:cs typeface="Arial" panose="020B0604020202020204" pitchFamily="34" charset="0"/>
+              </a:rPr>
+              <a:t>Simulated data are not consistent with real data</a:t>
+            </a:r>
+            <a:endParaRPr lang="en-US" sz="1100" i="1" dirty="0">
+              <a:latin typeface="Arial" panose="020B0604020202020204" pitchFamily="34" charset="0"/>
+              <a:cs typeface="Arial" panose="020B0604020202020204" pitchFamily="34" charset="0"/>
+            </a:endParaRPr>
+          </a:p>
+        </p:txBody>
+      </p:sp>
+      <p:sp>
+        <p:nvSpPr>
+          <p:cNvPr id="6" name="Circular Arrow 5"/>
+          <p:cNvSpPr/>
+          <p:nvPr/>
+        </p:nvSpPr>
+        <p:spPr>
+          <a:xfrm rot="5400000">
+            <a:off x="2454901" y="655182"/>
+            <a:ext cx="676275" cy="846917"/>
+          </a:xfrm>
+          <a:prstGeom prst="circularArrow">
+            <a:avLst>
+              <a:gd name="adj1" fmla="val 12500"/>
+              <a:gd name="adj2" fmla="val 1142319"/>
+              <a:gd name="adj3" fmla="val 20457681"/>
+              <a:gd name="adj4" fmla="val 10800000"/>
+              <a:gd name="adj5" fmla="val 12289"/>
+            </a:avLst>
+          </a:prstGeom>
+          <a:solidFill>
+            <a:schemeClr val="bg1">
+              <a:lumMod val="75000"/>
+            </a:schemeClr>
+          </a:solidFill>
+          <a:ln>
+            <a:noFill/>
+          </a:ln>
+        </p:spPr>
+        <p:style>
+          <a:lnRef idx="2">
+            <a:schemeClr val="accent1">
+              <a:shade val="50000"/>
+            </a:schemeClr>
+          </a:lnRef>
+          <a:fillRef idx="1">
+            <a:schemeClr val="accent1"/>
+          </a:fillRef>
+          <a:effectRef idx="0">
+            <a:schemeClr val="accent1"/>
+          </a:effectRef>
+          <a:fontRef idx="minor">
+            <a:schemeClr val="lt1"/>
+          </a:fontRef>
+        </p:style>
+        <p:txBody>
+          <a:bodyPr rtlCol="0" anchor="ctr"/>
+          <a:lstStyle/>
+          <a:p>
+            <a:pPr algn="ctr"/>
+            <a:endParaRPr lang="en-US">
+              <a:solidFill>
+                <a:schemeClr val="tx1"/>
+              </a:solidFill>
+            </a:endParaRPr>
+          </a:p>
+        </p:txBody>
+      </p:sp>
+      <p:sp>
+        <p:nvSpPr>
+          <p:cNvPr id="26" name="TextBox 25"/>
+          <p:cNvSpPr txBox="1"/>
+          <p:nvPr/>
+        </p:nvSpPr>
+        <p:spPr>
+          <a:xfrm rot="1199264">
+            <a:off x="1898600" y="2710233"/>
+            <a:ext cx="1373875" cy="261610"/>
+          </a:xfrm>
+          <a:prstGeom prst="rect">
+            <a:avLst/>
+          </a:prstGeom>
+          <a:noFill/>
+        </p:spPr>
+        <p:txBody>
+          <a:bodyPr wrap="square" rtlCol="0">
+            <a:spAutoFit/>
+          </a:bodyPr>
+          <a:lstStyle/>
+          <a:p>
+            <a:pPr algn="ctr"/>
+            <a:r>
+              <a:rPr lang="en-US" sz="1100" i="1" dirty="0" smtClean="0">
+                <a:latin typeface="Arial" panose="020B0604020202020204" pitchFamily="34" charset="0"/>
+                <a:cs typeface="Arial" panose="020B0604020202020204" pitchFamily="34" charset="0"/>
+              </a:rPr>
+              <a:t>Non-Gaussian</a:t>
+            </a:r>
+            <a:endParaRPr lang="en-US" sz="1100" i="1" dirty="0">
+              <a:latin typeface="Arial" panose="020B0604020202020204" pitchFamily="34" charset="0"/>
+              <a:cs typeface="Arial" panose="020B0604020202020204" pitchFamily="34" charset="0"/>
+            </a:endParaRPr>
+          </a:p>
+        </p:txBody>
+      </p:sp>
+    </p:spTree>
+    <p:extLst>
+      <p:ext uri="{BB962C8B-B14F-4D97-AF65-F5344CB8AC3E}">
+        <p14:creationId xmlns:p14="http://schemas.microsoft.com/office/powerpoint/2010/main" val="3089737503"/>
       </p:ext>
     </p:extLst>
   </p:cSld>

</xml_diff>

<commit_message>
Mistake in distribution table.
</commit_message>
<xml_diff>
--- a/manuscript/figures/workflow_figure.pptx
+++ b/manuscript/figures/workflow_figure.pptx
@@ -5054,8 +5054,8 @@
         </p:nvSpPr>
         <p:spPr>
           <a:xfrm rot="16200000">
-            <a:off x="3984305" y="3008449"/>
-            <a:ext cx="2948152" cy="369332"/>
+            <a:off x="3518126" y="3120366"/>
+            <a:ext cx="3880514" cy="369332"/>
           </a:xfrm>
           <a:prstGeom prst="rect">
             <a:avLst/>
@@ -5074,7 +5074,7 @@
                 <a:latin typeface="Arial" panose="020B0604020202020204" pitchFamily="34" charset="0"/>
                 <a:cs typeface="Arial" panose="020B0604020202020204" pitchFamily="34" charset="0"/>
               </a:rPr>
-              <a:t>Kurtosis</a:t>
+              <a:t>Excess Kurtosis (relative to Normal)</a:t>
             </a:r>
             <a:endParaRPr lang="en-US" dirty="0">
               <a:latin typeface="Arial" panose="020B0604020202020204" pitchFamily="34" charset="0"/>
@@ -5092,14 +5092,14 @@
           <p:nvPr>
             <p:extLst>
               <p:ext uri="{D42A27DB-BD31-4B8C-83A1-F6EECF244321}">
-                <p14:modId xmlns:p14="http://schemas.microsoft.com/office/powerpoint/2010/main" val="1744599731"/>
+                <p14:modId xmlns:p14="http://schemas.microsoft.com/office/powerpoint/2010/main" val="499071373"/>
               </p:ext>
             </p:extLst>
           </p:nvPr>
         </p:nvGraphicFramePr>
         <p:xfrm>
           <a:off x="5695378" y="1258886"/>
-          <a:ext cx="3973715" cy="4108609"/>
+          <a:ext cx="3973715" cy="4491371"/>
         </p:xfrm>
         <a:graphic>
           <a:graphicData uri="http://schemas.openxmlformats.org/drawingml/2006/table">
@@ -5115,14 +5115,14 @@
                     </a:ext>
                   </a:extLst>
                 </a:gridCol>
-                <a:gridCol w="1545843">
+                <a:gridCol w="1572795">
                   <a:extLst>
                     <a:ext uri="{9D8B030D-6E8A-4147-A177-3AD203B41FA5}">
                       <a16:colId xmlns:a16="http://schemas.microsoft.com/office/drawing/2014/main" val="872546237"/>
                     </a:ext>
                   </a:extLst>
                 </a:gridCol>
-                <a:gridCol w="1575627">
+                <a:gridCol w="1548675">
                   <a:extLst>
                     <a:ext uri="{9D8B030D-6E8A-4147-A177-3AD203B41FA5}">
                       <a16:colId xmlns:a16="http://schemas.microsoft.com/office/drawing/2014/main" val="3333672044"/>
@@ -5149,21 +5149,22 @@
                     <a:bodyPr/>
                     <a:lstStyle/>
                     <a:p>
+                      <a:pPr algn="ctr"/>
                       <a:r>
-                        <a:rPr lang="en-US" sz="1400" dirty="0" smtClean="0">
+                        <a:rPr lang="en-US" sz="1400" u="sng" dirty="0" smtClean="0">
                           <a:latin typeface="Arial" panose="020B0604020202020204" pitchFamily="34" charset="0"/>
                           <a:cs typeface="Arial" panose="020B0604020202020204" pitchFamily="34" charset="0"/>
                         </a:rPr>
                         <a:t>No</a:t>
                       </a:r>
                       <a:r>
-                        <a:rPr lang="en-US" sz="1400" baseline="0" dirty="0" smtClean="0">
+                        <a:rPr lang="en-US" sz="1400" u="sng" baseline="0" dirty="0" smtClean="0">
                           <a:latin typeface="Arial" panose="020B0604020202020204" pitchFamily="34" charset="0"/>
                           <a:cs typeface="Arial" panose="020B0604020202020204" pitchFamily="34" charset="0"/>
                         </a:rPr>
                         <a:t> skew</a:t>
                       </a:r>
-                      <a:endParaRPr lang="en-US" sz="1400" dirty="0">
+                      <a:endParaRPr lang="en-US" sz="1400" u="sng" dirty="0">
                         <a:latin typeface="Arial" panose="020B0604020202020204" pitchFamily="34" charset="0"/>
                         <a:cs typeface="Arial" panose="020B0604020202020204" pitchFamily="34" charset="0"/>
                       </a:endParaRPr>
@@ -5176,14 +5177,15 @@
                     <a:bodyPr/>
                     <a:lstStyle/>
                     <a:p>
+                      <a:pPr algn="ctr"/>
                       <a:r>
-                        <a:rPr lang="en-US" sz="1400" dirty="0" smtClean="0">
+                        <a:rPr lang="en-US" sz="1400" u="sng" dirty="0" smtClean="0">
                           <a:latin typeface="Arial" panose="020B0604020202020204" pitchFamily="34" charset="0"/>
                           <a:cs typeface="Arial" panose="020B0604020202020204" pitchFamily="34" charset="0"/>
                         </a:rPr>
                         <a:t>Negative ↔ positive skew</a:t>
                       </a:r>
-                      <a:endParaRPr lang="en-US" sz="1400" dirty="0">
+                      <a:endParaRPr lang="en-US" sz="1400" u="sng" dirty="0">
                         <a:latin typeface="Arial" panose="020B0604020202020204" pitchFamily="34" charset="0"/>
                         <a:cs typeface="Arial" panose="020B0604020202020204" pitchFamily="34" charset="0"/>
                       </a:endParaRPr>
@@ -5203,14 +5205,15 @@
                     <a:bodyPr/>
                     <a:lstStyle/>
                     <a:p>
+                      <a:pPr algn="ctr"/>
                       <a:r>
-                        <a:rPr lang="en-US" sz="1400" dirty="0" err="1" smtClean="0">
+                        <a:rPr lang="en-US" sz="1400" u="sng" dirty="0" smtClean="0">
                           <a:latin typeface="Arial" panose="020B0604020202020204" pitchFamily="34" charset="0"/>
                           <a:cs typeface="Arial" panose="020B0604020202020204" pitchFamily="34" charset="0"/>
                         </a:rPr>
-                        <a:t>Mesokurtic</a:t>
+                        <a:t>None</a:t>
                       </a:r>
-                      <a:endParaRPr lang="en-US" sz="1400" dirty="0">
+                      <a:endParaRPr lang="en-US" sz="1400" u="sng" dirty="0">
                         <a:latin typeface="Arial" panose="020B0604020202020204" pitchFamily="34" charset="0"/>
                         <a:cs typeface="Arial" panose="020B0604020202020204" pitchFamily="34" charset="0"/>
                       </a:endParaRPr>
@@ -5272,20 +5275,21 @@
                   </a:ext>
                 </a:extLst>
               </a:tr>
-              <a:tr h="1010942">
+              <a:tr h="1029211">
                 <a:tc>
                   <a:txBody>
                     <a:bodyPr/>
                     <a:lstStyle/>
                     <a:p>
+                      <a:pPr algn="ctr"/>
                       <a:r>
-                        <a:rPr lang="en-US" sz="1400" dirty="0" smtClean="0">
+                        <a:rPr lang="en-US" sz="1400" u="sng" dirty="0" smtClean="0">
                           <a:latin typeface="Arial" panose="020B0604020202020204" pitchFamily="34" charset="0"/>
                           <a:cs typeface="Arial" panose="020B0604020202020204" pitchFamily="34" charset="0"/>
                         </a:rPr>
-                        <a:t>Leptokurtic</a:t>
+                        <a:t>Positive</a:t>
                       </a:r>
-                      <a:endParaRPr lang="en-US" sz="1400" dirty="0">
+                      <a:endParaRPr lang="en-US" sz="1400" u="sng" dirty="0">
                         <a:latin typeface="Arial" panose="020B0604020202020204" pitchFamily="34" charset="0"/>
                         <a:cs typeface="Arial" panose="020B0604020202020204" pitchFamily="34" charset="0"/>
                       </a:endParaRPr>
@@ -5442,31 +5446,18 @@
                         <a:buChar char="•"/>
                       </a:pPr>
                       <a:r>
-                        <a:rPr lang="en-US" sz="1400" i="1" dirty="0" smtClean="0">
+                        <a:rPr lang="en-US" sz="1400" i="0" dirty="0" smtClean="0">
                           <a:latin typeface="Arial" panose="020B0604020202020204" pitchFamily="34" charset="0"/>
                           <a:cs typeface="Arial" panose="020B0604020202020204" pitchFamily="34" charset="0"/>
                         </a:rPr>
-                        <a:t>t</a:t>
+                        <a:t>Exponential-Generalized </a:t>
                       </a:r>
                       <a:r>
                         <a:rPr lang="en-US" sz="1400" i="0" dirty="0" smtClean="0">
                           <a:latin typeface="Arial" panose="020B0604020202020204" pitchFamily="34" charset="0"/>
                           <a:cs typeface="Arial" panose="020B0604020202020204" pitchFamily="34" charset="0"/>
                         </a:rPr>
-                        <a:t> distribution</a:t>
-                      </a:r>
-                    </a:p>
-                    <a:p>
-                      <a:pPr marL="285750" indent="-285750">
-                        <a:buFont typeface="Arial" panose="020B0604020202020204" pitchFamily="34" charset="0"/>
-                        <a:buChar char="•"/>
-                      </a:pPr>
-                      <a:r>
-                        <a:rPr lang="en-US" sz="1400" i="0" dirty="0" smtClean="0">
-                          <a:latin typeface="Arial" panose="020B0604020202020204" pitchFamily="34" charset="0"/>
-                          <a:cs typeface="Arial" panose="020B0604020202020204" pitchFamily="34" charset="0"/>
-                        </a:rPr>
-                        <a:t>Exponential-Generalized Beta</a:t>
+                        <a:t>Beta</a:t>
                       </a:r>
                     </a:p>
                     <a:p>
@@ -5502,27 +5493,35 @@
                   </a:ext>
                 </a:extLst>
               </a:tr>
-              <a:tr h="1151564">
+              <a:tr h="1754362">
                 <a:tc>
                   <a:txBody>
                     <a:bodyPr/>
                     <a:lstStyle/>
                     <a:p>
+                      <a:pPr algn="ctr"/>
                       <a:r>
-                        <a:rPr lang="en-US" sz="1400" dirty="0" err="1" smtClean="0">
+                        <a:rPr lang="en-US" sz="1400" u="sng" dirty="0" smtClean="0">
                           <a:latin typeface="Arial" panose="020B0604020202020204" pitchFamily="34" charset="0"/>
                           <a:cs typeface="Arial" panose="020B0604020202020204" pitchFamily="34" charset="0"/>
                         </a:rPr>
-                        <a:t>Platykurtic</a:t>
+                        <a:t>Negative </a:t>
                       </a:r>
                       <a:r>
-                        <a:rPr lang="en-US" sz="1400" dirty="0" smtClean="0">
+                        <a:rPr lang="en-US" sz="1400" u="sng" dirty="0" smtClean="0">
                           <a:latin typeface="Arial" panose="020B0604020202020204" pitchFamily="34" charset="0"/>
                           <a:cs typeface="Arial" panose="020B0604020202020204" pitchFamily="34" charset="0"/>
                         </a:rPr>
-                        <a:t> ↔ Leptokurtic</a:t>
+                        <a:t>↔ </a:t>
                       </a:r>
-                      <a:endParaRPr lang="en-US" sz="1400" dirty="0">
+                      <a:r>
+                        <a:rPr lang="en-US" sz="1400" u="sng" dirty="0" smtClean="0">
+                          <a:latin typeface="Arial" panose="020B0604020202020204" pitchFamily="34" charset="0"/>
+                          <a:cs typeface="Arial" panose="020B0604020202020204" pitchFamily="34" charset="0"/>
+                        </a:rPr>
+                        <a:t>Positive</a:t>
+                      </a:r>
+                      <a:endParaRPr lang="en-US" sz="1400" u="sng" dirty="0">
                         <a:latin typeface="Arial" panose="020B0604020202020204" pitchFamily="34" charset="0"/>
                         <a:cs typeface="Arial" panose="020B0604020202020204" pitchFamily="34" charset="0"/>
                       </a:endParaRPr>
@@ -5677,8 +5676,8 @@
         </p:nvSpPr>
         <p:spPr>
           <a:xfrm>
-            <a:off x="2997561" y="872121"/>
-            <a:ext cx="1373875" cy="430887"/>
+            <a:off x="3041284" y="966014"/>
+            <a:ext cx="1373875" cy="261610"/>
           </a:xfrm>
           <a:prstGeom prst="rect">
             <a:avLst/>
@@ -5697,7 +5696,14 @@
                 <a:latin typeface="Arial" panose="020B0604020202020204" pitchFamily="34" charset="0"/>
                 <a:cs typeface="Arial" panose="020B0604020202020204" pitchFamily="34" charset="0"/>
               </a:rPr>
-              <a:t>Fixed-effects model selection</a:t>
+              <a:t>Model </a:t>
+            </a:r>
+            <a:r>
+              <a:rPr lang="en-US" sz="1100" i="1" dirty="0" smtClean="0">
+                <a:latin typeface="Arial" panose="020B0604020202020204" pitchFamily="34" charset="0"/>
+                <a:cs typeface="Arial" panose="020B0604020202020204" pitchFamily="34" charset="0"/>
+              </a:rPr>
+              <a:t>selection</a:t>
             </a:r>
             <a:endParaRPr lang="en-US" sz="1100" i="1" dirty="0">
               <a:latin typeface="Arial" panose="020B0604020202020204" pitchFamily="34" charset="0"/>

</xml_diff>

<commit_message>
updated figure that that the gaussian path still have a 'simulate data' finish.
</commit_message>
<xml_diff>
--- a/manuscript/figures/workflow_figure.pptx
+++ b/manuscript/figures/workflow_figure.pptx
@@ -244,7 +244,7 @@
           <a:p>
             <a:fld id="{BA75D34D-A376-4547-8179-9AA895ACA30F}" type="datetimeFigureOut">
               <a:rPr lang="en-US" smtClean="0"/>
-              <a:t>8/5/2020</a:t>
+              <a:t>8/9/2020</a:t>
             </a:fld>
             <a:endParaRPr lang="en-US"/>
           </a:p>
@@ -414,7 +414,7 @@
           <a:p>
             <a:fld id="{BA75D34D-A376-4547-8179-9AA895ACA30F}" type="datetimeFigureOut">
               <a:rPr lang="en-US" smtClean="0"/>
-              <a:t>8/5/2020</a:t>
+              <a:t>8/9/2020</a:t>
             </a:fld>
             <a:endParaRPr lang="en-US"/>
           </a:p>
@@ -594,7 +594,7 @@
           <a:p>
             <a:fld id="{BA75D34D-A376-4547-8179-9AA895ACA30F}" type="datetimeFigureOut">
               <a:rPr lang="en-US" smtClean="0"/>
-              <a:t>8/5/2020</a:t>
+              <a:t>8/9/2020</a:t>
             </a:fld>
             <a:endParaRPr lang="en-US"/>
           </a:p>
@@ -764,7 +764,7 @@
           <a:p>
             <a:fld id="{BA75D34D-A376-4547-8179-9AA895ACA30F}" type="datetimeFigureOut">
               <a:rPr lang="en-US" smtClean="0"/>
-              <a:t>8/5/2020</a:t>
+              <a:t>8/9/2020</a:t>
             </a:fld>
             <a:endParaRPr lang="en-US"/>
           </a:p>
@@ -1008,7 +1008,7 @@
           <a:p>
             <a:fld id="{BA75D34D-A376-4547-8179-9AA895ACA30F}" type="datetimeFigureOut">
               <a:rPr lang="en-US" smtClean="0"/>
-              <a:t>8/5/2020</a:t>
+              <a:t>8/9/2020</a:t>
             </a:fld>
             <a:endParaRPr lang="en-US"/>
           </a:p>
@@ -1240,7 +1240,7 @@
           <a:p>
             <a:fld id="{BA75D34D-A376-4547-8179-9AA895ACA30F}" type="datetimeFigureOut">
               <a:rPr lang="en-US" smtClean="0"/>
-              <a:t>8/5/2020</a:t>
+              <a:t>8/9/2020</a:t>
             </a:fld>
             <a:endParaRPr lang="en-US"/>
           </a:p>
@@ -1607,7 +1607,7 @@
           <a:p>
             <a:fld id="{BA75D34D-A376-4547-8179-9AA895ACA30F}" type="datetimeFigureOut">
               <a:rPr lang="en-US" smtClean="0"/>
-              <a:t>8/5/2020</a:t>
+              <a:t>8/9/2020</a:t>
             </a:fld>
             <a:endParaRPr lang="en-US"/>
           </a:p>
@@ -1725,7 +1725,7 @@
           <a:p>
             <a:fld id="{BA75D34D-A376-4547-8179-9AA895ACA30F}" type="datetimeFigureOut">
               <a:rPr lang="en-US" smtClean="0"/>
-              <a:t>8/5/2020</a:t>
+              <a:t>8/9/2020</a:t>
             </a:fld>
             <a:endParaRPr lang="en-US"/>
           </a:p>
@@ -1820,7 +1820,7 @@
           <a:p>
             <a:fld id="{BA75D34D-A376-4547-8179-9AA895ACA30F}" type="datetimeFigureOut">
               <a:rPr lang="en-US" smtClean="0"/>
-              <a:t>8/5/2020</a:t>
+              <a:t>8/9/2020</a:t>
             </a:fld>
             <a:endParaRPr lang="en-US"/>
           </a:p>
@@ -2097,7 +2097,7 @@
           <a:p>
             <a:fld id="{BA75D34D-A376-4547-8179-9AA895ACA30F}" type="datetimeFigureOut">
               <a:rPr lang="en-US" smtClean="0"/>
-              <a:t>8/5/2020</a:t>
+              <a:t>8/9/2020</a:t>
             </a:fld>
             <a:endParaRPr lang="en-US"/>
           </a:p>
@@ -2354,7 +2354,7 @@
           <a:p>
             <a:fld id="{BA75D34D-A376-4547-8179-9AA895ACA30F}" type="datetimeFigureOut">
               <a:rPr lang="en-US" smtClean="0"/>
-              <a:t>8/5/2020</a:t>
+              <a:t>8/9/2020</a:t>
             </a:fld>
             <a:endParaRPr lang="en-US"/>
           </a:p>
@@ -2567,7 +2567,7 @@
           <a:p>
             <a:fld id="{BA75D34D-A376-4547-8179-9AA895ACA30F}" type="datetimeFigureOut">
               <a:rPr lang="en-US" smtClean="0"/>
-              <a:t>8/5/2020</a:t>
+              <a:t>8/9/2020</a:t>
             </a:fld>
             <a:endParaRPr lang="en-US"/>
           </a:p>
@@ -4535,7 +4535,7 @@
         <p:spPr>
           <a:xfrm>
             <a:off x="1895266" y="5355194"/>
-            <a:ext cx="2468880" cy="646331"/>
+            <a:ext cx="2468880" cy="923330"/>
           </a:xfrm>
           <a:prstGeom prst="rect">
             <a:avLst/>
@@ -4559,7 +4559,21 @@
                 <a:latin typeface="Arial" panose="020B0604020202020204" pitchFamily="34" charset="0"/>
                 <a:cs typeface="Arial" panose="020B0604020202020204" pitchFamily="34" charset="0"/>
               </a:rPr>
-              <a:t>Compute diagnostics and assess fit</a:t>
+              <a:t>Simulate data, c</a:t>
+            </a:r>
+            <a:r>
+              <a:rPr lang="en-US" dirty="0" smtClean="0">
+                <a:latin typeface="Arial" panose="020B0604020202020204" pitchFamily="34" charset="0"/>
+                <a:cs typeface="Arial" panose="020B0604020202020204" pitchFamily="34" charset="0"/>
+              </a:rPr>
+              <a:t>ompute </a:t>
+            </a:r>
+            <a:r>
+              <a:rPr lang="en-US" dirty="0" smtClean="0">
+                <a:latin typeface="Arial" panose="020B0604020202020204" pitchFamily="34" charset="0"/>
+                <a:cs typeface="Arial" panose="020B0604020202020204" pitchFamily="34" charset="0"/>
+              </a:rPr>
+              <a:t>diagnostics and assess fit</a:t>
             </a:r>
             <a:endParaRPr lang="en-US" dirty="0">
               <a:latin typeface="Arial" panose="020B0604020202020204" pitchFamily="34" charset="0"/>
@@ -4655,50 +4669,13 @@
       </p:sp>
       <p:sp>
         <p:nvSpPr>
-          <p:cNvPr id="16" name="TextBox 15"/>
-          <p:cNvSpPr txBox="1"/>
-          <p:nvPr/>
-        </p:nvSpPr>
-        <p:spPr>
-          <a:xfrm>
-            <a:off x="-332547" y="3143914"/>
-            <a:ext cx="1197033" cy="338554"/>
-          </a:xfrm>
-          <a:prstGeom prst="rect">
-            <a:avLst/>
-          </a:prstGeom>
-          <a:noFill/>
-        </p:spPr>
-        <p:txBody>
-          <a:bodyPr wrap="square" rtlCol="0">
-            <a:spAutoFit/>
-          </a:bodyPr>
-          <a:lstStyle/>
-          <a:p>
-            <a:pPr algn="ctr"/>
-            <a:r>
-              <a:rPr lang="en-US" sz="1600" b="1" dirty="0" smtClean="0">
-                <a:latin typeface="Arial" panose="020B0604020202020204" pitchFamily="34" charset="0"/>
-                <a:cs typeface="Arial" panose="020B0604020202020204" pitchFamily="34" charset="0"/>
-              </a:rPr>
-              <a:t>DONE</a:t>
-            </a:r>
-            <a:endParaRPr lang="en-US" sz="1600" b="1" dirty="0">
-              <a:latin typeface="Arial" panose="020B0604020202020204" pitchFamily="34" charset="0"/>
-              <a:cs typeface="Arial" panose="020B0604020202020204" pitchFamily="34" charset="0"/>
-            </a:endParaRPr>
-          </a:p>
-        </p:txBody>
-      </p:sp>
-      <p:sp>
-        <p:nvSpPr>
           <p:cNvPr id="17" name="TextBox 16"/>
           <p:cNvSpPr txBox="1"/>
           <p:nvPr/>
         </p:nvSpPr>
         <p:spPr>
           <a:xfrm>
-            <a:off x="2531189" y="6460834"/>
+            <a:off x="2534982" y="6807672"/>
             <a:ext cx="1197033" cy="338554"/>
           </a:xfrm>
           <a:prstGeom prst="rect">
@@ -4772,14 +4749,13 @@
           <p:cNvPr id="20" name="Straight Arrow Connector 19"/>
           <p:cNvCxnSpPr>
             <a:stCxn id="5" idx="2"/>
-            <a:endCxn id="16" idx="0"/>
           </p:cNvCxnSpPr>
           <p:nvPr/>
         </p:nvCxnSpPr>
         <p:spPr>
           <a:xfrm flipH="1">
-            <a:off x="265970" y="2577196"/>
-            <a:ext cx="1292629" cy="566718"/>
+            <a:off x="324157" y="2577196"/>
+            <a:ext cx="1234442" cy="566716"/>
           </a:xfrm>
           <a:prstGeom prst="straightConnector1">
             <a:avLst/>
@@ -4859,7 +4835,7 @@
         <p:spPr>
           <a:xfrm>
             <a:off x="3129706" y="4895885"/>
-            <a:ext cx="0" cy="459309"/>
+            <a:ext cx="0" cy="459308"/>
           </a:xfrm>
           <a:prstGeom prst="straightConnector1">
             <a:avLst/>
@@ -4898,8 +4874,8 @@
         </p:nvCxnSpPr>
         <p:spPr>
           <a:xfrm>
-            <a:off x="3129706" y="6001525"/>
-            <a:ext cx="0" cy="459309"/>
+            <a:off x="3129706" y="6278524"/>
+            <a:ext cx="3793" cy="529148"/>
           </a:xfrm>
           <a:prstGeom prst="straightConnector1">
             <a:avLst/>
@@ -4979,11 +4955,11 @@
         <p:spPr>
           <a:xfrm rot="10800000">
             <a:off x="1895266" y="3467080"/>
-            <a:ext cx="12700" cy="2211280"/>
+            <a:ext cx="12700" cy="2376000"/>
           </a:xfrm>
           <a:prstGeom prst="bentConnector3">
             <a:avLst>
-              <a:gd name="adj1" fmla="val 2781819"/>
+              <a:gd name="adj1" fmla="val 1800000"/>
             </a:avLst>
           </a:prstGeom>
           <a:ln>
@@ -5092,14 +5068,14 @@
           <p:nvPr>
             <p:extLst>
               <p:ext uri="{D42A27DB-BD31-4B8C-83A1-F6EECF244321}">
-                <p14:modId xmlns:p14="http://schemas.microsoft.com/office/powerpoint/2010/main" val="499071373"/>
+                <p14:modId xmlns:p14="http://schemas.microsoft.com/office/powerpoint/2010/main" val="1908527818"/>
               </p:ext>
             </p:extLst>
           </p:nvPr>
         </p:nvGraphicFramePr>
         <p:xfrm>
           <a:off x="5695378" y="1258886"/>
-          <a:ext cx="3973715" cy="4491371"/>
+          <a:ext cx="4276586" cy="4491371"/>
         </p:xfrm>
         <a:graphic>
           <a:graphicData uri="http://schemas.openxmlformats.org/drawingml/2006/table">
@@ -5115,14 +5091,14 @@
                     </a:ext>
                   </a:extLst>
                 </a:gridCol>
-                <a:gridCol w="1572795">
+                <a:gridCol w="1545499">
                   <a:extLst>
                     <a:ext uri="{9D8B030D-6E8A-4147-A177-3AD203B41FA5}">
                       <a16:colId xmlns:a16="http://schemas.microsoft.com/office/drawing/2014/main" val="872546237"/>
                     </a:ext>
                   </a:extLst>
                 </a:gridCol>
-                <a:gridCol w="1548675">
+                <a:gridCol w="1878842">
                   <a:extLst>
                     <a:ext uri="{9D8B030D-6E8A-4147-A177-3AD203B41FA5}">
                       <a16:colId xmlns:a16="http://schemas.microsoft.com/office/drawing/2014/main" val="3333672044"/>
@@ -5155,14 +5131,7 @@
                           <a:latin typeface="Arial" panose="020B0604020202020204" pitchFamily="34" charset="0"/>
                           <a:cs typeface="Arial" panose="020B0604020202020204" pitchFamily="34" charset="0"/>
                         </a:rPr>
-                        <a:t>No</a:t>
-                      </a:r>
-                      <a:r>
-                        <a:rPr lang="en-US" sz="1400" u="sng" baseline="0" dirty="0" smtClean="0">
-                          <a:latin typeface="Arial" panose="020B0604020202020204" pitchFamily="34" charset="0"/>
-                          <a:cs typeface="Arial" panose="020B0604020202020204" pitchFamily="34" charset="0"/>
-                        </a:rPr>
-                        <a:t> skew</a:t>
+                        <a:t>None</a:t>
                       </a:r>
                       <a:endParaRPr lang="en-US" sz="1400" u="sng" dirty="0">
                         <a:latin typeface="Arial" panose="020B0604020202020204" pitchFamily="34" charset="0"/>
@@ -5183,7 +5152,14 @@
                           <a:latin typeface="Arial" panose="020B0604020202020204" pitchFamily="34" charset="0"/>
                           <a:cs typeface="Arial" panose="020B0604020202020204" pitchFamily="34" charset="0"/>
                         </a:rPr>
-                        <a:t>Negative ↔ positive skew</a:t>
+                        <a:t>Negative ↔ </a:t>
+                      </a:r>
+                      <a:r>
+                        <a:rPr lang="en-US" sz="1400" u="sng" dirty="0" smtClean="0">
+                          <a:latin typeface="Arial" panose="020B0604020202020204" pitchFamily="34" charset="0"/>
+                          <a:cs typeface="Arial" panose="020B0604020202020204" pitchFamily="34" charset="0"/>
+                        </a:rPr>
+                        <a:t>positive</a:t>
                       </a:r>
                       <a:endParaRPr lang="en-US" sz="1400" u="sng" dirty="0">
                         <a:latin typeface="Arial" panose="020B0604020202020204" pitchFamily="34" charset="0"/>
@@ -5450,14 +5426,7 @@
                           <a:latin typeface="Arial" panose="020B0604020202020204" pitchFamily="34" charset="0"/>
                           <a:cs typeface="Arial" panose="020B0604020202020204" pitchFamily="34" charset="0"/>
                         </a:rPr>
-                        <a:t>Exponential-Generalized </a:t>
-                      </a:r>
-                      <a:r>
-                        <a:rPr lang="en-US" sz="1400" i="0" dirty="0" smtClean="0">
-                          <a:latin typeface="Arial" panose="020B0604020202020204" pitchFamily="34" charset="0"/>
-                          <a:cs typeface="Arial" panose="020B0604020202020204" pitchFamily="34" charset="0"/>
-                        </a:rPr>
-                        <a:t>Beta</a:t>
+                        <a:t>Exponential-Generalized Beta</a:t>
                       </a:r>
                     </a:p>
                     <a:p>
@@ -5505,21 +5474,7 @@
                           <a:latin typeface="Arial" panose="020B0604020202020204" pitchFamily="34" charset="0"/>
                           <a:cs typeface="Arial" panose="020B0604020202020204" pitchFamily="34" charset="0"/>
                         </a:rPr>
-                        <a:t>Negative </a:t>
-                      </a:r>
-                      <a:r>
-                        <a:rPr lang="en-US" sz="1400" u="sng" dirty="0" smtClean="0">
-                          <a:latin typeface="Arial" panose="020B0604020202020204" pitchFamily="34" charset="0"/>
-                          <a:cs typeface="Arial" panose="020B0604020202020204" pitchFamily="34" charset="0"/>
-                        </a:rPr>
-                        <a:t>↔ </a:t>
-                      </a:r>
-                      <a:r>
-                        <a:rPr lang="en-US" sz="1400" u="sng" dirty="0" smtClean="0">
-                          <a:latin typeface="Arial" panose="020B0604020202020204" pitchFamily="34" charset="0"/>
-                          <a:cs typeface="Arial" panose="020B0604020202020204" pitchFamily="34" charset="0"/>
-                        </a:rPr>
-                        <a:t>Positive</a:t>
+                        <a:t>Negative ↔ Positive</a:t>
                       </a:r>
                       <a:endParaRPr lang="en-US" sz="1400" u="sng" dirty="0">
                         <a:latin typeface="Arial" panose="020B0604020202020204" pitchFamily="34" charset="0"/>
@@ -5696,14 +5651,7 @@
                 <a:latin typeface="Arial" panose="020B0604020202020204" pitchFamily="34" charset="0"/>
                 <a:cs typeface="Arial" panose="020B0604020202020204" pitchFamily="34" charset="0"/>
               </a:rPr>
-              <a:t>Model </a:t>
-            </a:r>
-            <a:r>
-              <a:rPr lang="en-US" sz="1100" i="1" dirty="0" smtClean="0">
-                <a:latin typeface="Arial" panose="020B0604020202020204" pitchFamily="34" charset="0"/>
-                <a:cs typeface="Arial" panose="020B0604020202020204" pitchFamily="34" charset="0"/>
-              </a:rPr>
-              <a:t>selection</a:t>
+              <a:t>Model selection</a:t>
             </a:r>
             <a:endParaRPr lang="en-US" sz="1100" i="1" dirty="0">
               <a:latin typeface="Arial" panose="020B0604020202020204" pitchFamily="34" charset="0"/>
@@ -5720,8 +5668,8 @@
         </p:nvSpPr>
         <p:spPr>
           <a:xfrm>
-            <a:off x="3129705" y="5983781"/>
-            <a:ext cx="1343030" cy="600164"/>
+            <a:off x="3041284" y="6330619"/>
+            <a:ext cx="1826962" cy="430887"/>
           </a:xfrm>
           <a:prstGeom prst="rect">
             <a:avLst/>
@@ -5881,6 +5829,44 @@
           </a:p>
         </p:txBody>
       </p:sp>
+      <p:cxnSp>
+        <p:nvCxnSpPr>
+          <p:cNvPr id="8" name="Elbow Connector 7"/>
+          <p:cNvCxnSpPr/>
+          <p:nvPr/>
+        </p:nvCxnSpPr>
+        <p:spPr>
+          <a:xfrm rot="16200000" flipH="1">
+            <a:off x="-354212" y="3822283"/>
+            <a:ext cx="2920558" cy="1563820"/>
+          </a:xfrm>
+          <a:prstGeom prst="bentConnector3">
+            <a:avLst>
+              <a:gd name="adj1" fmla="val 100022"/>
+            </a:avLst>
+          </a:prstGeom>
+          <a:ln>
+            <a:solidFill>
+              <a:schemeClr val="tx1"/>
+            </a:solidFill>
+            <a:tailEnd type="stealth"/>
+          </a:ln>
+        </p:spPr>
+        <p:style>
+          <a:lnRef idx="1">
+            <a:schemeClr val="accent1"/>
+          </a:lnRef>
+          <a:fillRef idx="0">
+            <a:schemeClr val="accent1"/>
+          </a:fillRef>
+          <a:effectRef idx="0">
+            <a:schemeClr val="accent1"/>
+          </a:effectRef>
+          <a:fontRef idx="minor">
+            <a:schemeClr val="tx1"/>
+          </a:fontRef>
+        </p:style>
+      </p:cxnSp>
     </p:spTree>
     <p:extLst>
       <p:ext uri="{BB962C8B-B14F-4D97-AF65-F5344CB8AC3E}">

</xml_diff>

<commit_message>
Updated workflow figure to include skewed t and edited some box text
</commit_message>
<xml_diff>
--- a/manuscript/figures/workflow_figure.pptx
+++ b/manuscript/figures/workflow_figure.pptx
@@ -244,7 +244,7 @@
           <a:p>
             <a:fld id="{BA75D34D-A376-4547-8179-9AA895ACA30F}" type="datetimeFigureOut">
               <a:rPr lang="en-US" smtClean="0"/>
-              <a:t>8/9/2020</a:t>
+              <a:t>8/20/2020</a:t>
             </a:fld>
             <a:endParaRPr lang="en-US"/>
           </a:p>
@@ -414,7 +414,7 @@
           <a:p>
             <a:fld id="{BA75D34D-A376-4547-8179-9AA895ACA30F}" type="datetimeFigureOut">
               <a:rPr lang="en-US" smtClean="0"/>
-              <a:t>8/9/2020</a:t>
+              <a:t>8/20/2020</a:t>
             </a:fld>
             <a:endParaRPr lang="en-US"/>
           </a:p>
@@ -594,7 +594,7 @@
           <a:p>
             <a:fld id="{BA75D34D-A376-4547-8179-9AA895ACA30F}" type="datetimeFigureOut">
               <a:rPr lang="en-US" smtClean="0"/>
-              <a:t>8/9/2020</a:t>
+              <a:t>8/20/2020</a:t>
             </a:fld>
             <a:endParaRPr lang="en-US"/>
           </a:p>
@@ -764,7 +764,7 @@
           <a:p>
             <a:fld id="{BA75D34D-A376-4547-8179-9AA895ACA30F}" type="datetimeFigureOut">
               <a:rPr lang="en-US" smtClean="0"/>
-              <a:t>8/9/2020</a:t>
+              <a:t>8/20/2020</a:t>
             </a:fld>
             <a:endParaRPr lang="en-US"/>
           </a:p>
@@ -1008,7 +1008,7 @@
           <a:p>
             <a:fld id="{BA75D34D-A376-4547-8179-9AA895ACA30F}" type="datetimeFigureOut">
               <a:rPr lang="en-US" smtClean="0"/>
-              <a:t>8/9/2020</a:t>
+              <a:t>8/20/2020</a:t>
             </a:fld>
             <a:endParaRPr lang="en-US"/>
           </a:p>
@@ -1240,7 +1240,7 @@
           <a:p>
             <a:fld id="{BA75D34D-A376-4547-8179-9AA895ACA30F}" type="datetimeFigureOut">
               <a:rPr lang="en-US" smtClean="0"/>
-              <a:t>8/9/2020</a:t>
+              <a:t>8/20/2020</a:t>
             </a:fld>
             <a:endParaRPr lang="en-US"/>
           </a:p>
@@ -1607,7 +1607,7 @@
           <a:p>
             <a:fld id="{BA75D34D-A376-4547-8179-9AA895ACA30F}" type="datetimeFigureOut">
               <a:rPr lang="en-US" smtClean="0"/>
-              <a:t>8/9/2020</a:t>
+              <a:t>8/20/2020</a:t>
             </a:fld>
             <a:endParaRPr lang="en-US"/>
           </a:p>
@@ -1725,7 +1725,7 @@
           <a:p>
             <a:fld id="{BA75D34D-A376-4547-8179-9AA895ACA30F}" type="datetimeFigureOut">
               <a:rPr lang="en-US" smtClean="0"/>
-              <a:t>8/9/2020</a:t>
+              <a:t>8/20/2020</a:t>
             </a:fld>
             <a:endParaRPr lang="en-US"/>
           </a:p>
@@ -1820,7 +1820,7 @@
           <a:p>
             <a:fld id="{BA75D34D-A376-4547-8179-9AA895ACA30F}" type="datetimeFigureOut">
               <a:rPr lang="en-US" smtClean="0"/>
-              <a:t>8/9/2020</a:t>
+              <a:t>8/20/2020</a:t>
             </a:fld>
             <a:endParaRPr lang="en-US"/>
           </a:p>
@@ -2097,7 +2097,7 @@
           <a:p>
             <a:fld id="{BA75D34D-A376-4547-8179-9AA895ACA30F}" type="datetimeFigureOut">
               <a:rPr lang="en-US" smtClean="0"/>
-              <a:t>8/9/2020</a:t>
+              <a:t>8/20/2020</a:t>
             </a:fld>
             <a:endParaRPr lang="en-US"/>
           </a:p>
@@ -2354,7 +2354,7 @@
           <a:p>
             <a:fld id="{BA75D34D-A376-4547-8179-9AA895ACA30F}" type="datetimeFigureOut">
               <a:rPr lang="en-US" smtClean="0"/>
-              <a:t>8/9/2020</a:t>
+              <a:t>8/20/2020</a:t>
             </a:fld>
             <a:endParaRPr lang="en-US"/>
           </a:p>
@@ -2567,7 +2567,7 @@
           <a:p>
             <a:fld id="{BA75D34D-A376-4547-8179-9AA895ACA30F}" type="datetimeFigureOut">
               <a:rPr lang="en-US" smtClean="0"/>
-              <a:t>8/9/2020</a:t>
+              <a:t>8/20/2020</a:t>
             </a:fld>
             <a:endParaRPr lang="en-US"/>
           </a:p>
@@ -4492,8 +4492,8 @@
         </p:nvSpPr>
         <p:spPr>
           <a:xfrm>
-            <a:off x="1895266" y="4249554"/>
-            <a:ext cx="2468880" cy="646331"/>
+            <a:off x="1895266" y="4058552"/>
+            <a:ext cx="2468880" cy="1077218"/>
           </a:xfrm>
           <a:prstGeom prst="rect">
             <a:avLst/>
@@ -4513,13 +4513,13 @@
           <a:p>
             <a:pPr algn="ctr"/>
             <a:r>
-              <a:rPr lang="en-US" dirty="0" smtClean="0">
+              <a:rPr lang="en-US" sz="1600" dirty="0" smtClean="0">
                 <a:latin typeface="Arial" panose="020B0604020202020204" pitchFamily="34" charset="0"/>
                 <a:cs typeface="Arial" panose="020B0604020202020204" pitchFamily="34" charset="0"/>
               </a:rPr>
-              <a:t>Re-fit with fixed-effect structure from step 1</a:t>
-            </a:r>
-            <a:endParaRPr lang="en-US" dirty="0">
+              <a:t>Re-fit, guided by pilot Gaussian and visual assessment of higher moments</a:t>
+            </a:r>
+            <a:endParaRPr lang="en-US" sz="1600" dirty="0">
               <a:latin typeface="Arial" panose="020B0604020202020204" pitchFamily="34" charset="0"/>
               <a:cs typeface="Arial" panose="020B0604020202020204" pitchFamily="34" charset="0"/>
             </a:endParaRPr>
@@ -4559,21 +4559,7 @@
                 <a:latin typeface="Arial" panose="020B0604020202020204" pitchFamily="34" charset="0"/>
                 <a:cs typeface="Arial" panose="020B0604020202020204" pitchFamily="34" charset="0"/>
               </a:rPr>
-              <a:t>Simulate data, c</a:t>
-            </a:r>
-            <a:r>
-              <a:rPr lang="en-US" dirty="0" smtClean="0">
-                <a:latin typeface="Arial" panose="020B0604020202020204" pitchFamily="34" charset="0"/>
-                <a:cs typeface="Arial" panose="020B0604020202020204" pitchFamily="34" charset="0"/>
-              </a:rPr>
-              <a:t>ompute </a:t>
-            </a:r>
-            <a:r>
-              <a:rPr lang="en-US" dirty="0" smtClean="0">
-                <a:latin typeface="Arial" panose="020B0604020202020204" pitchFamily="34" charset="0"/>
-                <a:cs typeface="Arial" panose="020B0604020202020204" pitchFamily="34" charset="0"/>
-              </a:rPr>
-              <a:t>diagnostics and assess fit</a:t>
+              <a:t>Simulate data, compute diagnostics and assess fit</a:t>
             </a:r>
             <a:endParaRPr lang="en-US" dirty="0">
               <a:latin typeface="Arial" panose="020B0604020202020204" pitchFamily="34" charset="0"/>
@@ -4795,7 +4781,7 @@
         <p:spPr>
           <a:xfrm>
             <a:off x="3129706" y="3790245"/>
-            <a:ext cx="0" cy="459309"/>
+            <a:ext cx="0" cy="268307"/>
           </a:xfrm>
           <a:prstGeom prst="straightConnector1">
             <a:avLst/>
@@ -4834,8 +4820,8 @@
         </p:nvCxnSpPr>
         <p:spPr>
           <a:xfrm>
-            <a:off x="3129706" y="4895885"/>
-            <a:ext cx="0" cy="459308"/>
+            <a:off x="3129706" y="5135770"/>
+            <a:ext cx="0" cy="219424"/>
           </a:xfrm>
           <a:prstGeom prst="straightConnector1">
             <a:avLst/>
@@ -5068,7 +5054,7 @@
           <p:nvPr>
             <p:extLst>
               <p:ext uri="{D42A27DB-BD31-4B8C-83A1-F6EECF244321}">
-                <p14:modId xmlns:p14="http://schemas.microsoft.com/office/powerpoint/2010/main" val="1908527818"/>
+                <p14:modId xmlns:p14="http://schemas.microsoft.com/office/powerpoint/2010/main" val="1908217898"/>
               </p:ext>
             </p:extLst>
           </p:nvPr>
@@ -5152,14 +5138,7 @@
                           <a:latin typeface="Arial" panose="020B0604020202020204" pitchFamily="34" charset="0"/>
                           <a:cs typeface="Arial" panose="020B0604020202020204" pitchFamily="34" charset="0"/>
                         </a:rPr>
-                        <a:t>Negative ↔ </a:t>
-                      </a:r>
-                      <a:r>
-                        <a:rPr lang="en-US" sz="1400" u="sng" dirty="0" smtClean="0">
-                          <a:latin typeface="Arial" panose="020B0604020202020204" pitchFamily="34" charset="0"/>
-                          <a:cs typeface="Arial" panose="020B0604020202020204" pitchFamily="34" charset="0"/>
-                        </a:rPr>
-                        <a:t>positive</a:t>
+                        <a:t>Negative ↔ positive</a:t>
                       </a:r>
                       <a:endParaRPr lang="en-US" sz="1400" u="sng" dirty="0">
                         <a:latin typeface="Arial" panose="020B0604020202020204" pitchFamily="34" charset="0"/>
@@ -5439,7 +5418,14 @@
                           <a:latin typeface="Arial" panose="020B0604020202020204" pitchFamily="34" charset="0"/>
                           <a:cs typeface="Arial" panose="020B0604020202020204" pitchFamily="34" charset="0"/>
                         </a:rPr>
-                        <a:t>Johnson’s S</a:t>
+                        <a:t>Johnson’s </a:t>
+                      </a:r>
+                      <a:r>
+                        <a:rPr lang="en-US" sz="1400" i="0" dirty="0" smtClean="0">
+                          <a:latin typeface="Arial" panose="020B0604020202020204" pitchFamily="34" charset="0"/>
+                          <a:cs typeface="Arial" panose="020B0604020202020204" pitchFamily="34" charset="0"/>
+                        </a:rPr>
+                        <a:t>S</a:t>
                       </a:r>
                       <a:r>
                         <a:rPr lang="en-US" sz="1400" i="0" baseline="-25000" dirty="0" smtClean="0">
@@ -5448,7 +5434,27 @@
                         </a:rPr>
                         <a:t>U</a:t>
                       </a:r>
-                      <a:endParaRPr lang="en-US" sz="1400" i="1" baseline="-25000" dirty="0">
+                    </a:p>
+                    <a:p>
+                      <a:pPr marL="285750" indent="-285750">
+                        <a:buFont typeface="Arial" panose="020B0604020202020204" pitchFamily="34" charset="0"/>
+                        <a:buChar char="•"/>
+                      </a:pPr>
+                      <a:r>
+                        <a:rPr lang="en-US" sz="1400" i="0" baseline="0" dirty="0" smtClean="0">
+                          <a:latin typeface="Arial" panose="020B0604020202020204" pitchFamily="34" charset="0"/>
+                          <a:cs typeface="Arial" panose="020B0604020202020204" pitchFamily="34" charset="0"/>
+                        </a:rPr>
+                        <a:t>Skewed </a:t>
+                      </a:r>
+                      <a:r>
+                        <a:rPr lang="en-US" sz="1400" i="1" baseline="0" dirty="0" smtClean="0">
+                          <a:latin typeface="Arial" panose="020B0604020202020204" pitchFamily="34" charset="0"/>
+                          <a:cs typeface="Arial" panose="020B0604020202020204" pitchFamily="34" charset="0"/>
+                        </a:rPr>
+                        <a:t>t</a:t>
+                      </a:r>
+                      <a:endParaRPr lang="en-US" sz="1400" i="1" baseline="0" dirty="0">
                         <a:latin typeface="Arial" panose="020B0604020202020204" pitchFamily="34" charset="0"/>
                         <a:cs typeface="Arial" panose="020B0604020202020204" pitchFamily="34" charset="0"/>
                       </a:endParaRPr>
@@ -5705,7 +5711,7 @@
         </p:nvSpPr>
         <p:spPr>
           <a:xfrm rot="16200000">
-            <a:off x="447961" y="4420498"/>
+            <a:off x="572656" y="4420498"/>
             <a:ext cx="1691392" cy="430887"/>
           </a:xfrm>
           <a:prstGeom prst="rect">

</xml_diff>